<commit_message>
First draft of pres completed
</commit_message>
<xml_diff>
--- a/PrezentationDNS.pptx
+++ b/PrezentationDNS.pptx
@@ -7,13 +7,29 @@
     <p:sldMasterId id="2147483684" r:id="rId3"/>
     <p:sldMasterId id="2147483696" r:id="rId4"/>
   </p:sldMasterIdLst>
+  <p:notesMasterIdLst>
+    <p:notesMasterId r:id="rId24"/>
+  </p:notesMasterIdLst>
   <p:sldIdLst>
     <p:sldId id="258" r:id="rId5"/>
     <p:sldId id="256" r:id="rId6"/>
-    <p:sldId id="257" r:id="rId7"/>
-    <p:sldId id="259" r:id="rId8"/>
-    <p:sldId id="260" r:id="rId9"/>
-    <p:sldId id="261" r:id="rId10"/>
+    <p:sldId id="259" r:id="rId7"/>
+    <p:sldId id="257" r:id="rId8"/>
+    <p:sldId id="261" r:id="rId9"/>
+    <p:sldId id="271" r:id="rId10"/>
+    <p:sldId id="273" r:id="rId11"/>
+    <p:sldId id="272" r:id="rId12"/>
+    <p:sldId id="274" r:id="rId13"/>
+    <p:sldId id="275" r:id="rId14"/>
+    <p:sldId id="276" r:id="rId15"/>
+    <p:sldId id="277" r:id="rId16"/>
+    <p:sldId id="260" r:id="rId17"/>
+    <p:sldId id="268" r:id="rId18"/>
+    <p:sldId id="267" r:id="rId19"/>
+    <p:sldId id="265" r:id="rId20"/>
+    <p:sldId id="264" r:id="rId21"/>
+    <p:sldId id="266" r:id="rId22"/>
+    <p:sldId id="262" r:id="rId23"/>
   </p:sldIdLst>
   <p:sldSz cx="12192000" cy="6858000"/>
   <p:notesSz cx="6858000" cy="9144000"/>
@@ -120,6 +136,444 @@
 </p:presentation>
 </file>
 
+<file path=ppt/notesMasters/notesMaster1.xml><?xml version="1.0" encoding="utf-8"?>
+<p:notesMaster xmlns:a="http://schemas.openxmlformats.org/drawingml/2006/main" xmlns:r="http://schemas.openxmlformats.org/officeDocument/2006/relationships" xmlns:p="http://schemas.openxmlformats.org/presentationml/2006/main">
+  <p:cSld>
+    <p:bg>
+      <p:bgRef idx="1001">
+        <a:schemeClr val="bg1"/>
+      </p:bgRef>
+    </p:bg>
+    <p:spTree>
+      <p:nvGrpSpPr>
+        <p:cNvPr id="1" name=""/>
+        <p:cNvGrpSpPr/>
+        <p:nvPr/>
+      </p:nvGrpSpPr>
+      <p:grpSpPr>
+        <a:xfrm>
+          <a:off x="0" y="0"/>
+          <a:ext cx="0" cy="0"/>
+          <a:chOff x="0" y="0"/>
+          <a:chExt cx="0" cy="0"/>
+        </a:xfrm>
+      </p:grpSpPr>
+      <p:sp>
+        <p:nvSpPr>
+          <p:cNvPr id="2" name="Header Placeholder 1"/>
+          <p:cNvSpPr>
+            <a:spLocks noGrp="1"/>
+          </p:cNvSpPr>
+          <p:nvPr>
+            <p:ph type="hdr" sz="quarter"/>
+          </p:nvPr>
+        </p:nvSpPr>
+        <p:spPr>
+          <a:xfrm>
+            <a:off x="0" y="0"/>
+            <a:ext cx="2971800" cy="458788"/>
+          </a:xfrm>
+          <a:prstGeom prst="rect">
+            <a:avLst/>
+          </a:prstGeom>
+        </p:spPr>
+        <p:txBody>
+          <a:bodyPr vert="horz" lIns="91440" tIns="45720" rIns="91440" bIns="45720" rtlCol="0"/>
+          <a:lstStyle>
+            <a:lvl1pPr algn="l">
+              <a:defRPr sz="1200"/>
+            </a:lvl1pPr>
+          </a:lstStyle>
+          <a:p>
+            <a:endParaRPr lang="en-GB"/>
+          </a:p>
+        </p:txBody>
+      </p:sp>
+      <p:sp>
+        <p:nvSpPr>
+          <p:cNvPr id="3" name="Date Placeholder 2"/>
+          <p:cNvSpPr>
+            <a:spLocks noGrp="1"/>
+          </p:cNvSpPr>
+          <p:nvPr>
+            <p:ph type="dt" idx="1"/>
+          </p:nvPr>
+        </p:nvSpPr>
+        <p:spPr>
+          <a:xfrm>
+            <a:off x="3884613" y="0"/>
+            <a:ext cx="2971800" cy="458788"/>
+          </a:xfrm>
+          <a:prstGeom prst="rect">
+            <a:avLst/>
+          </a:prstGeom>
+        </p:spPr>
+        <p:txBody>
+          <a:bodyPr vert="horz" lIns="91440" tIns="45720" rIns="91440" bIns="45720" rtlCol="0"/>
+          <a:lstStyle>
+            <a:lvl1pPr algn="r">
+              <a:defRPr sz="1200"/>
+            </a:lvl1pPr>
+          </a:lstStyle>
+          <a:p>
+            <a:fld id="{34A54550-DD4D-4408-BFB6-679A4A8433E6}" type="datetimeFigureOut">
+              <a:rPr lang="en-GB" smtClean="0"/>
+              <a:t>04/10/2018</a:t>
+            </a:fld>
+            <a:endParaRPr lang="en-GB"/>
+          </a:p>
+        </p:txBody>
+      </p:sp>
+      <p:sp>
+        <p:nvSpPr>
+          <p:cNvPr id="4" name="Slide Image Placeholder 3"/>
+          <p:cNvSpPr>
+            <a:spLocks noGrp="1" noRot="1" noChangeAspect="1"/>
+          </p:cNvSpPr>
+          <p:nvPr>
+            <p:ph type="sldImg" idx="2"/>
+          </p:nvPr>
+        </p:nvSpPr>
+        <p:spPr>
+          <a:xfrm>
+            <a:off x="685800" y="1143000"/>
+            <a:ext cx="5486400" cy="3086100"/>
+          </a:xfrm>
+          <a:prstGeom prst="rect">
+            <a:avLst/>
+          </a:prstGeom>
+          <a:noFill/>
+          <a:ln w="12700">
+            <a:solidFill>
+              <a:prstClr val="black"/>
+            </a:solidFill>
+          </a:ln>
+        </p:spPr>
+        <p:txBody>
+          <a:bodyPr vert="horz" lIns="91440" tIns="45720" rIns="91440" bIns="45720" rtlCol="0" anchor="ctr"/>
+          <a:lstStyle/>
+          <a:p>
+            <a:endParaRPr lang="en-GB"/>
+          </a:p>
+        </p:txBody>
+      </p:sp>
+      <p:sp>
+        <p:nvSpPr>
+          <p:cNvPr id="5" name="Notes Placeholder 4"/>
+          <p:cNvSpPr>
+            <a:spLocks noGrp="1"/>
+          </p:cNvSpPr>
+          <p:nvPr>
+            <p:ph type="body" sz="quarter" idx="3"/>
+          </p:nvPr>
+        </p:nvSpPr>
+        <p:spPr>
+          <a:xfrm>
+            <a:off x="685800" y="4400550"/>
+            <a:ext cx="5486400" cy="3600450"/>
+          </a:xfrm>
+          <a:prstGeom prst="rect">
+            <a:avLst/>
+          </a:prstGeom>
+        </p:spPr>
+        <p:txBody>
+          <a:bodyPr vert="horz" lIns="91440" tIns="45720" rIns="91440" bIns="45720" rtlCol="0"/>
+          <a:lstStyle/>
+          <a:p>
+            <a:pPr lvl="0"/>
+            <a:r>
+              <a:rPr lang="en-US"/>
+              <a:t>Edit Master text styles</a:t>
+            </a:r>
+          </a:p>
+          <a:p>
+            <a:pPr lvl="1"/>
+            <a:r>
+              <a:rPr lang="en-US"/>
+              <a:t>Second level</a:t>
+            </a:r>
+          </a:p>
+          <a:p>
+            <a:pPr lvl="2"/>
+            <a:r>
+              <a:rPr lang="en-US"/>
+              <a:t>Third level</a:t>
+            </a:r>
+          </a:p>
+          <a:p>
+            <a:pPr lvl="3"/>
+            <a:r>
+              <a:rPr lang="en-US"/>
+              <a:t>Fourth level</a:t>
+            </a:r>
+          </a:p>
+          <a:p>
+            <a:pPr lvl="4"/>
+            <a:r>
+              <a:rPr lang="en-US"/>
+              <a:t>Fifth level</a:t>
+            </a:r>
+            <a:endParaRPr lang="en-GB"/>
+          </a:p>
+        </p:txBody>
+      </p:sp>
+      <p:sp>
+        <p:nvSpPr>
+          <p:cNvPr id="6" name="Footer Placeholder 5"/>
+          <p:cNvSpPr>
+            <a:spLocks noGrp="1"/>
+          </p:cNvSpPr>
+          <p:nvPr>
+            <p:ph type="ftr" sz="quarter" idx="4"/>
+          </p:nvPr>
+        </p:nvSpPr>
+        <p:spPr>
+          <a:xfrm>
+            <a:off x="0" y="8685213"/>
+            <a:ext cx="2971800" cy="458787"/>
+          </a:xfrm>
+          <a:prstGeom prst="rect">
+            <a:avLst/>
+          </a:prstGeom>
+        </p:spPr>
+        <p:txBody>
+          <a:bodyPr vert="horz" lIns="91440" tIns="45720" rIns="91440" bIns="45720" rtlCol="0" anchor="b"/>
+          <a:lstStyle>
+            <a:lvl1pPr algn="l">
+              <a:defRPr sz="1200"/>
+            </a:lvl1pPr>
+          </a:lstStyle>
+          <a:p>
+            <a:endParaRPr lang="en-GB"/>
+          </a:p>
+        </p:txBody>
+      </p:sp>
+      <p:sp>
+        <p:nvSpPr>
+          <p:cNvPr id="7" name="Slide Number Placeholder 6"/>
+          <p:cNvSpPr>
+            <a:spLocks noGrp="1"/>
+          </p:cNvSpPr>
+          <p:nvPr>
+            <p:ph type="sldNum" sz="quarter" idx="5"/>
+          </p:nvPr>
+        </p:nvSpPr>
+        <p:spPr>
+          <a:xfrm>
+            <a:off x="3884613" y="8685213"/>
+            <a:ext cx="2971800" cy="458787"/>
+          </a:xfrm>
+          <a:prstGeom prst="rect">
+            <a:avLst/>
+          </a:prstGeom>
+        </p:spPr>
+        <p:txBody>
+          <a:bodyPr vert="horz" lIns="91440" tIns="45720" rIns="91440" bIns="45720" rtlCol="0" anchor="b"/>
+          <a:lstStyle>
+            <a:lvl1pPr algn="r">
+              <a:defRPr sz="1200"/>
+            </a:lvl1pPr>
+          </a:lstStyle>
+          <a:p>
+            <a:fld id="{06A446E4-BAFC-4836-BECB-E3B61A5EC0CC}" type="slidenum">
+              <a:rPr lang="en-GB" smtClean="0"/>
+              <a:t>‹#›</a:t>
+            </a:fld>
+            <a:endParaRPr lang="en-GB"/>
+          </a:p>
+        </p:txBody>
+      </p:sp>
+    </p:spTree>
+    <p:extLst>
+      <p:ext uri="{BB962C8B-B14F-4D97-AF65-F5344CB8AC3E}">
+        <p14:creationId xmlns:p14="http://schemas.microsoft.com/office/powerpoint/2010/main" val="4010692458"/>
+      </p:ext>
+    </p:extLst>
+  </p:cSld>
+  <p:clrMap bg1="lt1" tx1="dk1" bg2="lt2" tx2="dk2" accent1="accent1" accent2="accent2" accent3="accent3" accent4="accent4" accent5="accent5" accent6="accent6" hlink="hlink" folHlink="folHlink"/>
+  <p:notesStyle>
+    <a:lvl1pPr marL="0" algn="l" defTabSz="914400" rtl="0" eaLnBrk="1" latinLnBrk="0" hangingPunct="1">
+      <a:defRPr sz="1200" kern="1200">
+        <a:solidFill>
+          <a:schemeClr val="tx1"/>
+        </a:solidFill>
+        <a:latin typeface="+mn-lt"/>
+        <a:ea typeface="+mn-ea"/>
+        <a:cs typeface="+mn-cs"/>
+      </a:defRPr>
+    </a:lvl1pPr>
+    <a:lvl2pPr marL="457200" algn="l" defTabSz="914400" rtl="0" eaLnBrk="1" latinLnBrk="0" hangingPunct="1">
+      <a:defRPr sz="1200" kern="1200">
+        <a:solidFill>
+          <a:schemeClr val="tx1"/>
+        </a:solidFill>
+        <a:latin typeface="+mn-lt"/>
+        <a:ea typeface="+mn-ea"/>
+        <a:cs typeface="+mn-cs"/>
+      </a:defRPr>
+    </a:lvl2pPr>
+    <a:lvl3pPr marL="914400" algn="l" defTabSz="914400" rtl="0" eaLnBrk="1" latinLnBrk="0" hangingPunct="1">
+      <a:defRPr sz="1200" kern="1200">
+        <a:solidFill>
+          <a:schemeClr val="tx1"/>
+        </a:solidFill>
+        <a:latin typeface="+mn-lt"/>
+        <a:ea typeface="+mn-ea"/>
+        <a:cs typeface="+mn-cs"/>
+      </a:defRPr>
+    </a:lvl3pPr>
+    <a:lvl4pPr marL="1371600" algn="l" defTabSz="914400" rtl="0" eaLnBrk="1" latinLnBrk="0" hangingPunct="1">
+      <a:defRPr sz="1200" kern="1200">
+        <a:solidFill>
+          <a:schemeClr val="tx1"/>
+        </a:solidFill>
+        <a:latin typeface="+mn-lt"/>
+        <a:ea typeface="+mn-ea"/>
+        <a:cs typeface="+mn-cs"/>
+      </a:defRPr>
+    </a:lvl4pPr>
+    <a:lvl5pPr marL="1828800" algn="l" defTabSz="914400" rtl="0" eaLnBrk="1" latinLnBrk="0" hangingPunct="1">
+      <a:defRPr sz="1200" kern="1200">
+        <a:solidFill>
+          <a:schemeClr val="tx1"/>
+        </a:solidFill>
+        <a:latin typeface="+mn-lt"/>
+        <a:ea typeface="+mn-ea"/>
+        <a:cs typeface="+mn-cs"/>
+      </a:defRPr>
+    </a:lvl5pPr>
+    <a:lvl6pPr marL="2286000" algn="l" defTabSz="914400" rtl="0" eaLnBrk="1" latinLnBrk="0" hangingPunct="1">
+      <a:defRPr sz="1200" kern="1200">
+        <a:solidFill>
+          <a:schemeClr val="tx1"/>
+        </a:solidFill>
+        <a:latin typeface="+mn-lt"/>
+        <a:ea typeface="+mn-ea"/>
+        <a:cs typeface="+mn-cs"/>
+      </a:defRPr>
+    </a:lvl6pPr>
+    <a:lvl7pPr marL="2743200" algn="l" defTabSz="914400" rtl="0" eaLnBrk="1" latinLnBrk="0" hangingPunct="1">
+      <a:defRPr sz="1200" kern="1200">
+        <a:solidFill>
+          <a:schemeClr val="tx1"/>
+        </a:solidFill>
+        <a:latin typeface="+mn-lt"/>
+        <a:ea typeface="+mn-ea"/>
+        <a:cs typeface="+mn-cs"/>
+      </a:defRPr>
+    </a:lvl7pPr>
+    <a:lvl8pPr marL="3200400" algn="l" defTabSz="914400" rtl="0" eaLnBrk="1" latinLnBrk="0" hangingPunct="1">
+      <a:defRPr sz="1200" kern="1200">
+        <a:solidFill>
+          <a:schemeClr val="tx1"/>
+        </a:solidFill>
+        <a:latin typeface="+mn-lt"/>
+        <a:ea typeface="+mn-ea"/>
+        <a:cs typeface="+mn-cs"/>
+      </a:defRPr>
+    </a:lvl8pPr>
+    <a:lvl9pPr marL="3657600" algn="l" defTabSz="914400" rtl="0" eaLnBrk="1" latinLnBrk="0" hangingPunct="1">
+      <a:defRPr sz="1200" kern="1200">
+        <a:solidFill>
+          <a:schemeClr val="tx1"/>
+        </a:solidFill>
+        <a:latin typeface="+mn-lt"/>
+        <a:ea typeface="+mn-ea"/>
+        <a:cs typeface="+mn-cs"/>
+      </a:defRPr>
+    </a:lvl9pPr>
+  </p:notesStyle>
+</p:notesMaster>
+</file>
+
+<file path=ppt/notesSlides/notesSlide1.xml><?xml version="1.0" encoding="utf-8"?>
+<p:notes xmlns:a="http://schemas.openxmlformats.org/drawingml/2006/main" xmlns:r="http://schemas.openxmlformats.org/officeDocument/2006/relationships" xmlns:p="http://schemas.openxmlformats.org/presentationml/2006/main">
+  <p:cSld>
+    <p:spTree>
+      <p:nvGrpSpPr>
+        <p:cNvPr id="1" name=""/>
+        <p:cNvGrpSpPr/>
+        <p:nvPr/>
+      </p:nvGrpSpPr>
+      <p:grpSpPr>
+        <a:xfrm>
+          <a:off x="0" y="0"/>
+          <a:ext cx="0" cy="0"/>
+          <a:chOff x="0" y="0"/>
+          <a:chExt cx="0" cy="0"/>
+        </a:xfrm>
+      </p:grpSpPr>
+      <p:sp>
+        <p:nvSpPr>
+          <p:cNvPr id="2" name="Slide Image Placeholder 1"/>
+          <p:cNvSpPr>
+            <a:spLocks noGrp="1" noRot="1" noChangeAspect="1"/>
+          </p:cNvSpPr>
+          <p:nvPr>
+            <p:ph type="sldImg"/>
+          </p:nvPr>
+        </p:nvSpPr>
+        <p:spPr/>
+      </p:sp>
+      <p:sp>
+        <p:nvSpPr>
+          <p:cNvPr id="3" name="Notes Placeholder 2"/>
+          <p:cNvSpPr>
+            <a:spLocks noGrp="1"/>
+          </p:cNvSpPr>
+          <p:nvPr>
+            <p:ph type="body" idx="1"/>
+          </p:nvPr>
+        </p:nvSpPr>
+        <p:spPr/>
+        <p:txBody>
+          <a:bodyPr/>
+          <a:lstStyle/>
+          <a:p>
+            <a:r>
+              <a:rPr lang="en-GB" dirty="0" err="1"/>
+              <a:t>ksjdfkldsjfl</a:t>
+            </a:r>
+            <a:endParaRPr lang="en-GB" dirty="0"/>
+          </a:p>
+        </p:txBody>
+      </p:sp>
+      <p:sp>
+        <p:nvSpPr>
+          <p:cNvPr id="4" name="Slide Number Placeholder 3"/>
+          <p:cNvSpPr>
+            <a:spLocks noGrp="1"/>
+          </p:cNvSpPr>
+          <p:nvPr>
+            <p:ph type="sldNum" sz="quarter" idx="10"/>
+          </p:nvPr>
+        </p:nvSpPr>
+        <p:spPr/>
+        <p:txBody>
+          <a:bodyPr/>
+          <a:lstStyle/>
+          <a:p>
+            <a:fld id="{06A446E4-BAFC-4836-BECB-E3B61A5EC0CC}" type="slidenum">
+              <a:rPr lang="en-GB" smtClean="0"/>
+              <a:t>3</a:t>
+            </a:fld>
+            <a:endParaRPr lang="en-GB"/>
+          </a:p>
+        </p:txBody>
+      </p:sp>
+    </p:spTree>
+    <p:extLst>
+      <p:ext uri="{BB962C8B-B14F-4D97-AF65-F5344CB8AC3E}">
+        <p14:creationId xmlns:p14="http://schemas.microsoft.com/office/powerpoint/2010/main" val="2075297226"/>
+      </p:ext>
+    </p:extLst>
+  </p:cSld>
+  <p:clrMapOvr>
+    <a:masterClrMapping/>
+  </p:clrMapOvr>
+</p:notes>
+</file>
+
 <file path=ppt/slideLayouts/slideLayout1.xml><?xml version="1.0" encoding="utf-8"?>
 <p:sldLayout xmlns:a="http://schemas.openxmlformats.org/drawingml/2006/main" xmlns:r="http://schemas.openxmlformats.org/officeDocument/2006/relationships" xmlns:p="http://schemas.openxmlformats.org/presentationml/2006/main" showMasterSp="0" type="title" preserve="1">
   <p:cSld name="Slajd tytułowy">
@@ -1324,7 +1778,7 @@
             <a:fld id="{9334D819-9F07-4261-B09B-9E467E5D9002}" type="datetimeFigureOut">
               <a:rPr lang="en-US" dirty="0"/>
               <a:pPr/>
-              <a:t>9/13/2018</a:t>
+              <a:t>10/4/2018</a:t>
             </a:fld>
             <a:endParaRPr lang="en-US" dirty="0"/>
           </a:p>
@@ -1558,7 +2012,7 @@
           <a:p>
             <a:fld id="{9334D819-9F07-4261-B09B-9E467E5D9002}" type="datetimeFigureOut">
               <a:rPr lang="en-US" dirty="0"/>
-              <a:t>9/13/2018</a:t>
+              <a:t>10/4/2018</a:t>
             </a:fld>
             <a:endParaRPr lang="en-US" dirty="0"/>
           </a:p>
@@ -1733,7 +2187,7 @@
           <a:p>
             <a:fld id="{9334D819-9F07-4261-B09B-9E467E5D9002}" type="datetimeFigureOut">
               <a:rPr lang="en-US" dirty="0"/>
-              <a:t>9/13/2018</a:t>
+              <a:t>10/4/2018</a:t>
             </a:fld>
             <a:endParaRPr lang="en-US" dirty="0"/>
           </a:p>
@@ -1937,7 +2391,7 @@
             <a:fld id="{9334D819-9F07-4261-B09B-9E467E5D9002}" type="datetimeFigureOut">
               <a:rPr lang="en-US" smtClean="0"/>
               <a:pPr/>
-              <a:t>9/13/2018</a:t>
+              <a:t>10/4/2018</a:t>
             </a:fld>
             <a:endParaRPr lang="en-US" dirty="0"/>
           </a:p>
@@ -2136,7 +2590,7 @@
           <a:p>
             <a:fld id="{9334D819-9F07-4261-B09B-9E467E5D9002}" type="datetimeFigureOut">
               <a:rPr lang="en-US" smtClean="0"/>
-              <a:t>9/13/2018</a:t>
+              <a:t>10/4/2018</a:t>
             </a:fld>
             <a:endParaRPr lang="en-US" dirty="0"/>
           </a:p>
@@ -2412,7 +2866,7 @@
             <a:fld id="{9334D819-9F07-4261-B09B-9E467E5D9002}" type="datetimeFigureOut">
               <a:rPr lang="en-US" smtClean="0"/>
               <a:pPr/>
-              <a:t>9/13/2018</a:t>
+              <a:t>10/4/2018</a:t>
             </a:fld>
             <a:endParaRPr lang="en-US" dirty="0"/>
           </a:p>
@@ -2678,7 +3132,7 @@
           <a:p>
             <a:fld id="{9334D819-9F07-4261-B09B-9E467E5D9002}" type="datetimeFigureOut">
               <a:rPr lang="en-US" smtClean="0"/>
-              <a:t>9/13/2018</a:t>
+              <a:t>10/4/2018</a:t>
             </a:fld>
             <a:endParaRPr lang="en-US" dirty="0"/>
           </a:p>
@@ -3095,7 +3549,7 @@
           <a:p>
             <a:fld id="{9334D819-9F07-4261-B09B-9E467E5D9002}" type="datetimeFigureOut">
               <a:rPr lang="en-US" smtClean="0"/>
-              <a:t>9/13/2018</a:t>
+              <a:t>10/4/2018</a:t>
             </a:fld>
             <a:endParaRPr lang="en-US" dirty="0"/>
           </a:p>
@@ -3241,7 +3695,7 @@
           <a:p>
             <a:fld id="{9334D819-9F07-4261-B09B-9E467E5D9002}" type="datetimeFigureOut">
               <a:rPr lang="en-US" smtClean="0"/>
-              <a:t>9/13/2018</a:t>
+              <a:t>10/4/2018</a:t>
             </a:fld>
             <a:endParaRPr lang="en-US" dirty="0"/>
           </a:p>
@@ -3354,7 +3808,7 @@
           <a:p>
             <a:fld id="{9334D819-9F07-4261-B09B-9E467E5D9002}" type="datetimeFigureOut">
               <a:rPr lang="en-US" smtClean="0"/>
-              <a:t>9/13/2018</a:t>
+              <a:t>10/4/2018</a:t>
             </a:fld>
             <a:endParaRPr lang="en-US" dirty="0"/>
           </a:p>
@@ -3665,7 +4119,7 @@
           <a:p>
             <a:fld id="{9334D819-9F07-4261-B09B-9E467E5D9002}" type="datetimeFigureOut">
               <a:rPr lang="en-US" smtClean="0"/>
-              <a:t>9/13/2018</a:t>
+              <a:t>10/4/2018</a:t>
             </a:fld>
             <a:endParaRPr lang="en-US" dirty="0"/>
           </a:p>
@@ -3852,7 +4306,7 @@
           <a:p>
             <a:fld id="{9334D819-9F07-4261-B09B-9E467E5D9002}" type="datetimeFigureOut">
               <a:rPr lang="en-US" dirty="0"/>
-              <a:t>9/13/2018</a:t>
+              <a:t>10/4/2018</a:t>
             </a:fld>
             <a:endParaRPr lang="en-US" dirty="0"/>
           </a:p>
@@ -4123,7 +4577,7 @@
           <a:p>
             <a:fld id="{9334D819-9F07-4261-B09B-9E467E5D9002}" type="datetimeFigureOut">
               <a:rPr lang="en-US" smtClean="0"/>
-              <a:t>9/13/2018</a:t>
+              <a:t>10/4/2018</a:t>
             </a:fld>
             <a:endParaRPr lang="en-US" dirty="0"/>
           </a:p>
@@ -4321,7 +4775,7 @@
           <a:p>
             <a:fld id="{9334D819-9F07-4261-B09B-9E467E5D9002}" type="datetimeFigureOut">
               <a:rPr lang="en-US" smtClean="0"/>
-              <a:t>9/13/2018</a:t>
+              <a:t>10/4/2018</a:t>
             </a:fld>
             <a:endParaRPr lang="en-US" dirty="0"/>
           </a:p>
@@ -4529,7 +4983,7 @@
           <a:p>
             <a:fld id="{9334D819-9F07-4261-B09B-9E467E5D9002}" type="datetimeFigureOut">
               <a:rPr lang="en-US" smtClean="0"/>
-              <a:t>9/13/2018</a:t>
+              <a:t>10/4/2018</a:t>
             </a:fld>
             <a:endParaRPr lang="en-US" dirty="0"/>
           </a:p>
@@ -4771,7 +5225,7 @@
             <a:fld id="{9334D819-9F07-4261-B09B-9E467E5D9002}" type="datetimeFigureOut">
               <a:rPr lang="en-US" smtClean="0"/>
               <a:pPr/>
-              <a:t>9/13/2018</a:t>
+              <a:t>10/4/2018</a:t>
             </a:fld>
             <a:endParaRPr lang="en-US" dirty="0"/>
           </a:p>
@@ -5000,7 +5454,7 @@
           <a:p>
             <a:fld id="{9334D819-9F07-4261-B09B-9E467E5D9002}" type="datetimeFigureOut">
               <a:rPr lang="en-US" smtClean="0"/>
-              <a:t>9/13/2018</a:t>
+              <a:t>10/4/2018</a:t>
             </a:fld>
             <a:endParaRPr lang="en-US" dirty="0"/>
           </a:p>
@@ -5255,7 +5709,7 @@
             <a:fld id="{9334D819-9F07-4261-B09B-9E467E5D9002}" type="datetimeFigureOut">
               <a:rPr lang="en-US" smtClean="0"/>
               <a:pPr/>
-              <a:t>9/13/2018</a:t>
+              <a:t>10/4/2018</a:t>
             </a:fld>
             <a:endParaRPr lang="en-US" dirty="0"/>
           </a:p>
@@ -5582,7 +6036,7 @@
           <a:p>
             <a:fld id="{9334D819-9F07-4261-B09B-9E467E5D9002}" type="datetimeFigureOut">
               <a:rPr lang="en-US" smtClean="0"/>
-              <a:t>9/13/2018</a:t>
+              <a:t>10/4/2018</a:t>
             </a:fld>
             <a:endParaRPr lang="en-US" dirty="0"/>
           </a:p>
@@ -6038,7 +6492,7 @@
           <a:p>
             <a:fld id="{9334D819-9F07-4261-B09B-9E467E5D9002}" type="datetimeFigureOut">
               <a:rPr lang="en-US" smtClean="0"/>
-              <a:t>9/13/2018</a:t>
+              <a:t>10/4/2018</a:t>
             </a:fld>
             <a:endParaRPr lang="en-US" dirty="0"/>
           </a:p>
@@ -6161,7 +6615,7 @@
           <a:p>
             <a:fld id="{9334D819-9F07-4261-B09B-9E467E5D9002}" type="datetimeFigureOut">
               <a:rPr lang="en-US" smtClean="0"/>
-              <a:t>9/13/2018</a:t>
+              <a:t>10/4/2018</a:t>
             </a:fld>
             <a:endParaRPr lang="en-US" dirty="0"/>
           </a:p>
@@ -6256,7 +6710,7 @@
           <a:p>
             <a:fld id="{9334D819-9F07-4261-B09B-9E467E5D9002}" type="datetimeFigureOut">
               <a:rPr lang="en-US" smtClean="0"/>
-              <a:t>9/13/2018</a:t>
+              <a:t>10/4/2018</a:t>
             </a:fld>
             <a:endParaRPr lang="en-US" dirty="0"/>
           </a:p>
@@ -6525,7 +6979,7 @@
             <a:fld id="{9334D819-9F07-4261-B09B-9E467E5D9002}" type="datetimeFigureOut">
               <a:rPr lang="en-US" dirty="0"/>
               <a:pPr/>
-              <a:t>9/13/2018</a:t>
+              <a:t>10/4/2018</a:t>
             </a:fld>
             <a:endParaRPr lang="en-US" dirty="0"/>
           </a:p>
@@ -7777,7 +8231,7 @@
           <a:p>
             <a:fld id="{9334D819-9F07-4261-B09B-9E467E5D9002}" type="datetimeFigureOut">
               <a:rPr lang="en-US" smtClean="0"/>
-              <a:t>9/13/2018</a:t>
+              <a:t>10/4/2018</a:t>
             </a:fld>
             <a:endParaRPr lang="en-US" dirty="0"/>
           </a:p>
@@ -8107,7 +8561,7 @@
           <a:p>
             <a:fld id="{9334D819-9F07-4261-B09B-9E467E5D9002}" type="datetimeFigureOut">
               <a:rPr lang="en-US" smtClean="0"/>
-              <a:t>9/13/2018</a:t>
+              <a:t>10/4/2018</a:t>
             </a:fld>
             <a:endParaRPr lang="en-US" dirty="0"/>
           </a:p>
@@ -8277,7 +8731,7 @@
           <a:p>
             <a:fld id="{9334D819-9F07-4261-B09B-9E467E5D9002}" type="datetimeFigureOut">
               <a:rPr lang="en-US" smtClean="0"/>
-              <a:t>9/13/2018</a:t>
+              <a:t>10/4/2018</a:t>
             </a:fld>
             <a:endParaRPr lang="en-US" dirty="0"/>
           </a:p>
@@ -8457,7 +8911,7 @@
           <a:p>
             <a:fld id="{9334D819-9F07-4261-B09B-9E467E5D9002}" type="datetimeFigureOut">
               <a:rPr lang="en-US" smtClean="0"/>
-              <a:t>9/13/2018</a:t>
+              <a:t>10/4/2018</a:t>
             </a:fld>
             <a:endParaRPr lang="en-US" dirty="0"/>
           </a:p>
@@ -8922,7 +9376,7 @@
             <a:fld id="{9334D819-9F07-4261-B09B-9E467E5D9002}" type="datetimeFigureOut">
               <a:rPr lang="en-US" smtClean="0"/>
               <a:pPr/>
-              <a:t>9/13/2018</a:t>
+              <a:t>10/4/2018</a:t>
             </a:fld>
             <a:endParaRPr lang="en-US" dirty="0"/>
           </a:p>
@@ -9102,7 +9556,7 @@
           <a:p>
             <a:fld id="{9334D819-9F07-4261-B09B-9E467E5D9002}" type="datetimeFigureOut">
               <a:rPr lang="en-US" smtClean="0"/>
-              <a:t>9/13/2018</a:t>
+              <a:t>10/4/2018</a:t>
             </a:fld>
             <a:endParaRPr lang="en-US" dirty="0"/>
           </a:p>
@@ -9416,7 +9870,7 @@
             <a:fld id="{9334D819-9F07-4261-B09B-9E467E5D9002}" type="datetimeFigureOut">
               <a:rPr lang="en-US" smtClean="0"/>
               <a:pPr/>
-              <a:t>9/13/2018</a:t>
+              <a:t>10/4/2018</a:t>
             </a:fld>
             <a:endParaRPr lang="en-US" dirty="0"/>
           </a:p>
@@ -9803,7 +10257,7 @@
           <a:p>
             <a:fld id="{9334D819-9F07-4261-B09B-9E467E5D9002}" type="datetimeFigureOut">
               <a:rPr lang="en-US" smtClean="0"/>
-              <a:t>9/13/2018</a:t>
+              <a:t>10/4/2018</a:t>
             </a:fld>
             <a:endParaRPr lang="en-US" dirty="0"/>
           </a:p>
@@ -10242,7 +10696,7 @@
           <a:p>
             <a:fld id="{9334D819-9F07-4261-B09B-9E467E5D9002}" type="datetimeFigureOut">
               <a:rPr lang="en-US" smtClean="0"/>
-              <a:t>9/13/2018</a:t>
+              <a:t>10/4/2018</a:t>
             </a:fld>
             <a:endParaRPr lang="en-US" dirty="0"/>
           </a:p>
@@ -10365,7 +10819,7 @@
           <a:p>
             <a:fld id="{9334D819-9F07-4261-B09B-9E467E5D9002}" type="datetimeFigureOut">
               <a:rPr lang="en-US" smtClean="0"/>
-              <a:t>9/13/2018</a:t>
+              <a:t>10/4/2018</a:t>
             </a:fld>
             <a:endParaRPr lang="en-US" dirty="0"/>
           </a:p>
@@ -10597,7 +11051,7 @@
           <a:p>
             <a:fld id="{9334D819-9F07-4261-B09B-9E467E5D9002}" type="datetimeFigureOut">
               <a:rPr lang="en-US" dirty="0"/>
-              <a:t>9/13/2018</a:t>
+              <a:t>10/4/2018</a:t>
             </a:fld>
             <a:endParaRPr lang="en-US" dirty="0"/>
           </a:p>
@@ -10692,7 +11146,7 @@
           <a:p>
             <a:fld id="{9334D819-9F07-4261-B09B-9E467E5D9002}" type="datetimeFigureOut">
               <a:rPr lang="en-US" smtClean="0"/>
-              <a:t>9/13/2018</a:t>
+              <a:t>10/4/2018</a:t>
             </a:fld>
             <a:endParaRPr lang="en-US" dirty="0"/>
           </a:p>
@@ -11042,7 +11496,7 @@
           <a:p>
             <a:fld id="{9334D819-9F07-4261-B09B-9E467E5D9002}" type="datetimeFigureOut">
               <a:rPr lang="en-US" smtClean="0"/>
-              <a:t>9/13/2018</a:t>
+              <a:t>10/4/2018</a:t>
             </a:fld>
             <a:endParaRPr lang="en-US" dirty="0"/>
           </a:p>
@@ -11472,7 +11926,7 @@
           <a:p>
             <a:fld id="{9334D819-9F07-4261-B09B-9E467E5D9002}" type="datetimeFigureOut">
               <a:rPr lang="en-US" smtClean="0"/>
-              <a:t>9/13/2018</a:t>
+              <a:t>10/4/2018</a:t>
             </a:fld>
             <a:endParaRPr lang="en-US" dirty="0"/>
           </a:p>
@@ -11712,7 +12166,7 @@
           <a:p>
             <a:fld id="{9334D819-9F07-4261-B09B-9E467E5D9002}" type="datetimeFigureOut">
               <a:rPr lang="en-US" smtClean="0"/>
-              <a:t>9/13/2018</a:t>
+              <a:t>10/4/2018</a:t>
             </a:fld>
             <a:endParaRPr lang="en-US" dirty="0"/>
           </a:p>
@@ -11892,7 +12346,7 @@
           <a:p>
             <a:fld id="{9334D819-9F07-4261-B09B-9E467E5D9002}" type="datetimeFigureOut">
               <a:rPr lang="en-US" smtClean="0"/>
-              <a:t>9/13/2018</a:t>
+              <a:t>10/4/2018</a:t>
             </a:fld>
             <a:endParaRPr lang="en-US" dirty="0"/>
           </a:p>
@@ -12277,7 +12731,7 @@
           <a:p>
             <a:fld id="{9334D819-9F07-4261-B09B-9E467E5D9002}" type="datetimeFigureOut">
               <a:rPr lang="en-US" dirty="0"/>
-              <a:t>9/13/2018</a:t>
+              <a:t>10/4/2018</a:t>
             </a:fld>
             <a:endParaRPr lang="en-US" dirty="0"/>
           </a:p>
@@ -12395,7 +12849,7 @@
           <a:p>
             <a:fld id="{9334D819-9F07-4261-B09B-9E467E5D9002}" type="datetimeFigureOut">
               <a:rPr lang="en-US" dirty="0"/>
-              <a:t>9/13/2018</a:t>
+              <a:t>10/4/2018</a:t>
             </a:fld>
             <a:endParaRPr lang="en-US" dirty="0"/>
           </a:p>
@@ -12485,7 +12939,7 @@
           <a:p>
             <a:fld id="{9334D819-9F07-4261-B09B-9E467E5D9002}" type="datetimeFigureOut">
               <a:rPr lang="en-US" dirty="0"/>
-              <a:t>9/13/2018</a:t>
+              <a:t>10/4/2018</a:t>
             </a:fld>
             <a:endParaRPr lang="en-US" dirty="0"/>
           </a:p>
@@ -13243,7 +13697,7 @@
           <a:p>
             <a:fld id="{9334D819-9F07-4261-B09B-9E467E5D9002}" type="datetimeFigureOut">
               <a:rPr lang="en-US" dirty="0"/>
-              <a:t>9/13/2018</a:t>
+              <a:t>10/4/2018</a:t>
             </a:fld>
             <a:endParaRPr lang="en-US" dirty="0"/>
           </a:p>
@@ -14078,7 +14532,7 @@
           <a:p>
             <a:fld id="{9334D819-9F07-4261-B09B-9E467E5D9002}" type="datetimeFigureOut">
               <a:rPr lang="en-US" dirty="0"/>
-              <a:t>9/13/2018</a:t>
+              <a:t>10/4/2018</a:t>
             </a:fld>
             <a:endParaRPr lang="en-US" dirty="0"/>
           </a:p>
@@ -14298,7 +14752,7 @@
             <a:fld id="{9334D819-9F07-4261-B09B-9E467E5D9002}" type="datetimeFigureOut">
               <a:rPr lang="en-US" dirty="0"/>
               <a:pPr/>
-              <a:t>9/13/2018</a:t>
+              <a:t>10/4/2018</a:t>
             </a:fld>
             <a:endParaRPr lang="en-US" dirty="0"/>
           </a:p>
@@ -15445,7 +15899,7 @@
             <a:fld id="{9334D819-9F07-4261-B09B-9E467E5D9002}" type="datetimeFigureOut">
               <a:rPr lang="en-US" smtClean="0"/>
               <a:pPr/>
-              <a:t>9/13/2018</a:t>
+              <a:t>10/4/2018</a:t>
             </a:fld>
             <a:endParaRPr lang="en-US" dirty="0"/>
           </a:p>
@@ -16045,7 +16499,7 @@
             <a:fld id="{9334D819-9F07-4261-B09B-9E467E5D9002}" type="datetimeFigureOut">
               <a:rPr lang="en-US" smtClean="0"/>
               <a:pPr/>
-              <a:t>9/13/2018</a:t>
+              <a:t>10/4/2018</a:t>
             </a:fld>
             <a:endParaRPr lang="en-US" dirty="0"/>
           </a:p>
@@ -16673,7 +17127,7 @@
             <a:fld id="{9334D819-9F07-4261-B09B-9E467E5D9002}" type="datetimeFigureOut">
               <a:rPr lang="en-US" smtClean="0"/>
               <a:pPr/>
-              <a:t>9/13/2018</a:t>
+              <a:t>10/4/2018</a:t>
             </a:fld>
             <a:endParaRPr lang="en-US" dirty="0"/>
           </a:p>
@@ -17245,7 +17699,7 @@
       <p:bgPr>
         <a:blipFill dpi="0" rotWithShape="1">
           <a:blip r:embed="rId2">
-            <a:alphaModFix amt="72000"/>
+            <a:alphaModFix amt="71000"/>
             <a:lum/>
           </a:blip>
           <a:srcRect/>
@@ -17285,7 +17739,7 @@
         <p:spPr>
           <a:xfrm>
             <a:off x="340426" y="1166842"/>
-            <a:ext cx="12112831" cy="4524315"/>
+            <a:ext cx="12112831" cy="4154984"/>
           </a:xfrm>
           <a:prstGeom prst="rect">
             <a:avLst/>
@@ -17299,7 +17753,7 @@
           <a:lstStyle/>
           <a:p>
             <a:r>
-              <a:rPr lang="pl-PL" sz="9600" spc="300" dirty="0">
+              <a:rPr lang="pl-PL" sz="8800" spc="300" dirty="0">
                 <a:solidFill>
                   <a:schemeClr val="bg1"/>
                 </a:solidFill>
@@ -17318,7 +17772,7 @@
           </a:p>
           <a:p>
             <a:r>
-              <a:rPr lang="pl-PL" sz="9600" spc="300" dirty="0">
+              <a:rPr lang="pl-PL" sz="8800" spc="300" dirty="0">
                 <a:solidFill>
                   <a:schemeClr val="bg1"/>
                 </a:solidFill>
@@ -17337,7 +17791,7 @@
           </a:p>
           <a:p>
             <a:r>
-              <a:rPr lang="pl-PL" sz="9600" spc="300" dirty="0">
+              <a:rPr lang="pl-PL" sz="8800" spc="300" dirty="0">
                 <a:solidFill>
                   <a:schemeClr val="bg1"/>
                 </a:solidFill>
@@ -17354,14 +17808,14 @@
               <a:t>STARTS </a:t>
             </a:r>
             <a:r>
-              <a:rPr lang="pl-PL" sz="9600" spc="300" dirty="0">
+              <a:rPr lang="pl-PL" sz="8800" spc="300" dirty="0">
                 <a:latin typeface="Haettenschweiler" panose="020B0706040902060204" pitchFamily="34" charset="0"/>
                 <a:ea typeface="STHupo" panose="020B0503020204020204" pitchFamily="2" charset="-122"/>
               </a:rPr>
               <a:t>HERE</a:t>
             </a:r>
             <a:r>
-              <a:rPr lang="pl-PL" sz="7200" spc="300" dirty="0">
+              <a:rPr lang="pl-PL" sz="6600" spc="300" dirty="0">
                 <a:latin typeface="Haettenschweiler" panose="020B0706040902060204" pitchFamily="34" charset="0"/>
                 <a:ea typeface="STHupo" panose="020B0503020204020204" pitchFamily="2" charset="-122"/>
               </a:rPr>
@@ -17374,6 +17828,1312 @@
     <p:extLst>
       <p:ext uri="{BB962C8B-B14F-4D97-AF65-F5344CB8AC3E}">
         <p14:creationId xmlns:p14="http://schemas.microsoft.com/office/powerpoint/2010/main" val="1857818454"/>
+      </p:ext>
+    </p:extLst>
+  </p:cSld>
+  <p:clrMapOvr>
+    <a:masterClrMapping/>
+  </p:clrMapOvr>
+</p:sld>
+</file>
+
+<file path=ppt/slides/slide10.xml><?xml version="1.0" encoding="utf-8"?>
+<p:sld xmlns:a="http://schemas.openxmlformats.org/drawingml/2006/main" xmlns:r="http://schemas.openxmlformats.org/officeDocument/2006/relationships" xmlns:p="http://schemas.openxmlformats.org/presentationml/2006/main">
+  <p:cSld>
+    <p:bg>
+      <p:bgPr>
+        <a:gradFill>
+          <a:gsLst>
+            <a:gs pos="0">
+              <a:schemeClr val="accent3">
+                <a:lumMod val="0"/>
+                <a:lumOff val="100000"/>
+              </a:schemeClr>
+            </a:gs>
+            <a:gs pos="35000">
+              <a:schemeClr val="accent3">
+                <a:lumMod val="0"/>
+                <a:lumOff val="100000"/>
+              </a:schemeClr>
+            </a:gs>
+            <a:gs pos="100000">
+              <a:schemeClr val="accent3">
+                <a:lumMod val="100000"/>
+              </a:schemeClr>
+            </a:gs>
+          </a:gsLst>
+          <a:path path="circle">
+            <a:fillToRect l="50000" t="-80000" r="50000" b="180000"/>
+          </a:path>
+        </a:gradFill>
+        <a:effectLst/>
+      </p:bgPr>
+    </p:bg>
+    <p:spTree>
+      <p:nvGrpSpPr>
+        <p:cNvPr id="1" name=""/>
+        <p:cNvGrpSpPr/>
+        <p:nvPr/>
+      </p:nvGrpSpPr>
+      <p:grpSpPr>
+        <a:xfrm>
+          <a:off x="0" y="0"/>
+          <a:ext cx="0" cy="0"/>
+          <a:chOff x="0" y="0"/>
+          <a:chExt cx="0" cy="0"/>
+        </a:xfrm>
+      </p:grpSpPr>
+      <p:sp>
+        <p:nvSpPr>
+          <p:cNvPr id="2" name="Tytuł 1">
+            <a:extLst>
+              <a:ext uri="{FF2B5EF4-FFF2-40B4-BE49-F238E27FC236}">
+                <a16:creationId xmlns:a16="http://schemas.microsoft.com/office/drawing/2014/main" id="{9C072613-9DB4-4BA4-996A-DCC73A6F36BF}"/>
+              </a:ext>
+            </a:extLst>
+          </p:cNvPr>
+          <p:cNvSpPr>
+            <a:spLocks noGrp="1"/>
+          </p:cNvSpPr>
+          <p:nvPr>
+            <p:ph type="title"/>
+          </p:nvPr>
+        </p:nvSpPr>
+        <p:spPr>
+          <a:xfrm>
+            <a:off x="834361" y="152004"/>
+            <a:ext cx="9692640" cy="1325562"/>
+          </a:xfrm>
+        </p:spPr>
+        <p:txBody>
+          <a:bodyPr>
+            <a:normAutofit/>
+          </a:bodyPr>
+          <a:lstStyle/>
+          <a:p>
+            <a:pPr algn="ctr"/>
+            <a:r>
+              <a:rPr lang="en-GB" sz="6000" dirty="0">
+                <a:latin typeface="Impact" panose="020B0806030902050204" pitchFamily="34" charset="0"/>
+              </a:rPr>
+              <a:t>Benefits/Costs</a:t>
+            </a:r>
+            <a:endParaRPr lang="pl-PL" sz="6000" dirty="0">
+              <a:latin typeface="Impact" panose="020B0806030902050204" pitchFamily="34" charset="0"/>
+            </a:endParaRPr>
+          </a:p>
+        </p:txBody>
+      </p:sp>
+      <p:sp>
+        <p:nvSpPr>
+          <p:cNvPr id="4" name="Symbol zastępczy zawartości 2">
+            <a:extLst>
+              <a:ext uri="{FF2B5EF4-FFF2-40B4-BE49-F238E27FC236}">
+                <a16:creationId xmlns:a16="http://schemas.microsoft.com/office/drawing/2014/main" id="{60D41FE0-5035-4C08-8F3E-72067F6655A5}"/>
+              </a:ext>
+            </a:extLst>
+          </p:cNvPr>
+          <p:cNvSpPr>
+            <a:spLocks noGrp="1"/>
+          </p:cNvSpPr>
+          <p:nvPr>
+            <p:ph idx="1"/>
+          </p:nvPr>
+        </p:nvSpPr>
+        <p:spPr>
+          <a:xfrm>
+            <a:off x="492369" y="1477566"/>
+            <a:ext cx="10269417" cy="4604709"/>
+          </a:xfrm>
+        </p:spPr>
+        <p:txBody>
+          <a:bodyPr>
+            <a:normAutofit fontScale="77500" lnSpcReduction="20000"/>
+          </a:bodyPr>
+          <a:lstStyle/>
+          <a:p>
+            <a:pPr marL="0" indent="0" algn="just">
+              <a:buNone/>
+            </a:pPr>
+            <a:r>
+              <a:rPr lang="en-GB" sz="2000" b="1" u="sng" dirty="0"/>
+              <a:t>Benefits</a:t>
+            </a:r>
+          </a:p>
+          <a:p>
+            <a:pPr algn="just"/>
+            <a:r>
+              <a:rPr lang="en-GB" sz="2000" dirty="0"/>
+              <a:t>A device that will be used as a template for the product that will be produced commercially</a:t>
+            </a:r>
+          </a:p>
+          <a:p>
+            <a:pPr algn="just"/>
+            <a:r>
+              <a:rPr lang="en-GB" sz="2000" dirty="0"/>
+              <a:t>A reputation for fine IoT device production</a:t>
+            </a:r>
+          </a:p>
+          <a:p>
+            <a:pPr algn="just"/>
+            <a:r>
+              <a:rPr lang="en-GB" sz="2000" dirty="0"/>
+              <a:t>A low cost of production of devices</a:t>
+            </a:r>
+          </a:p>
+          <a:p>
+            <a:pPr algn="just"/>
+            <a:r>
+              <a:rPr lang="en-GB" sz="2000" dirty="0"/>
+              <a:t>Easy to produce</a:t>
+            </a:r>
+          </a:p>
+          <a:p>
+            <a:pPr algn="just"/>
+            <a:r>
+              <a:rPr lang="en-GB" sz="2000" dirty="0"/>
+              <a:t>Easy to advertise due to the fact the product is suitable for multiple use cases</a:t>
+            </a:r>
+          </a:p>
+          <a:p>
+            <a:pPr algn="just"/>
+            <a:r>
+              <a:rPr lang="en-GB" sz="2000" dirty="0"/>
+              <a:t>Low maintenance costs</a:t>
+            </a:r>
+          </a:p>
+          <a:p>
+            <a:pPr marL="0" indent="0" algn="just">
+              <a:buNone/>
+            </a:pPr>
+            <a:r>
+              <a:rPr lang="en-GB" sz="2000" b="1" u="sng" dirty="0"/>
+              <a:t>Costs</a:t>
+            </a:r>
+          </a:p>
+          <a:p>
+            <a:pPr algn="just"/>
+            <a:r>
+              <a:rPr lang="en-GB" sz="2000" dirty="0"/>
+              <a:t>The hardware needed</a:t>
+            </a:r>
+          </a:p>
+          <a:p>
+            <a:pPr algn="just"/>
+            <a:r>
+              <a:rPr lang="en-GB" sz="2000" dirty="0"/>
+              <a:t>The maintenance of the production line</a:t>
+            </a:r>
+          </a:p>
+          <a:p>
+            <a:pPr algn="just"/>
+            <a:r>
+              <a:rPr lang="en-GB" sz="2000" dirty="0"/>
+              <a:t>The database and web hosting will also need to be paid for by the client</a:t>
+            </a:r>
+          </a:p>
+          <a:p>
+            <a:pPr algn="just"/>
+            <a:r>
+              <a:rPr lang="en-GB" sz="2000" dirty="0"/>
+              <a:t>Potential commercial licences licenses</a:t>
+            </a:r>
+          </a:p>
+          <a:p>
+            <a:pPr algn="just"/>
+            <a:endParaRPr lang="en-GB" sz="2000" dirty="0"/>
+          </a:p>
+          <a:p>
+            <a:pPr algn="just"/>
+            <a:endParaRPr lang="en-GB" sz="2000" dirty="0"/>
+          </a:p>
+        </p:txBody>
+      </p:sp>
+    </p:spTree>
+    <p:extLst>
+      <p:ext uri="{BB962C8B-B14F-4D97-AF65-F5344CB8AC3E}">
+        <p14:creationId xmlns:p14="http://schemas.microsoft.com/office/powerpoint/2010/main" val="2112982231"/>
+      </p:ext>
+    </p:extLst>
+  </p:cSld>
+  <p:clrMapOvr>
+    <a:masterClrMapping/>
+  </p:clrMapOvr>
+</p:sld>
+</file>
+
+<file path=ppt/slides/slide11.xml><?xml version="1.0" encoding="utf-8"?>
+<p:sld xmlns:a="http://schemas.openxmlformats.org/drawingml/2006/main" xmlns:r="http://schemas.openxmlformats.org/officeDocument/2006/relationships" xmlns:p="http://schemas.openxmlformats.org/presentationml/2006/main">
+  <p:cSld>
+    <p:bg>
+      <p:bgPr>
+        <a:gradFill flip="none" rotWithShape="1">
+          <a:gsLst>
+            <a:gs pos="0">
+              <a:schemeClr val="accent3">
+                <a:lumMod val="0"/>
+                <a:lumOff val="100000"/>
+              </a:schemeClr>
+            </a:gs>
+            <a:gs pos="35000">
+              <a:schemeClr val="accent3">
+                <a:lumMod val="0"/>
+                <a:lumOff val="100000"/>
+              </a:schemeClr>
+            </a:gs>
+            <a:gs pos="100000">
+              <a:schemeClr val="accent3">
+                <a:lumMod val="100000"/>
+              </a:schemeClr>
+            </a:gs>
+          </a:gsLst>
+          <a:path path="circle">
+            <a:fillToRect l="50000" t="-80000" r="50000" b="180000"/>
+          </a:path>
+          <a:tileRect/>
+        </a:gradFill>
+        <a:effectLst/>
+      </p:bgPr>
+    </p:bg>
+    <p:spTree>
+      <p:nvGrpSpPr>
+        <p:cNvPr id="1" name=""/>
+        <p:cNvGrpSpPr/>
+        <p:nvPr/>
+      </p:nvGrpSpPr>
+      <p:grpSpPr>
+        <a:xfrm>
+          <a:off x="0" y="0"/>
+          <a:ext cx="0" cy="0"/>
+          <a:chOff x="0" y="0"/>
+          <a:chExt cx="0" cy="0"/>
+        </a:xfrm>
+      </p:grpSpPr>
+      <p:sp>
+        <p:nvSpPr>
+          <p:cNvPr id="2" name="Tytuł 1">
+            <a:extLst>
+              <a:ext uri="{FF2B5EF4-FFF2-40B4-BE49-F238E27FC236}">
+                <a16:creationId xmlns:a16="http://schemas.microsoft.com/office/drawing/2014/main" id="{9C072613-9DB4-4BA4-996A-DCC73A6F36BF}"/>
+              </a:ext>
+            </a:extLst>
+          </p:cNvPr>
+          <p:cNvSpPr>
+            <a:spLocks noGrp="1"/>
+          </p:cNvSpPr>
+          <p:nvPr>
+            <p:ph type="title"/>
+          </p:nvPr>
+        </p:nvSpPr>
+        <p:spPr>
+          <a:xfrm>
+            <a:off x="834361" y="152004"/>
+            <a:ext cx="9692640" cy="1325562"/>
+          </a:xfrm>
+        </p:spPr>
+        <p:txBody>
+          <a:bodyPr>
+            <a:normAutofit/>
+          </a:bodyPr>
+          <a:lstStyle/>
+          <a:p>
+            <a:pPr algn="ctr"/>
+            <a:r>
+              <a:rPr lang="en-GB" sz="6000" dirty="0">
+                <a:latin typeface="Impact" panose="020B0806030902050204" pitchFamily="34" charset="0"/>
+              </a:rPr>
+              <a:t>Going forward </a:t>
+            </a:r>
+            <a:endParaRPr lang="pl-PL" sz="6000" dirty="0">
+              <a:latin typeface="Impact" panose="020B0806030902050204" pitchFamily="34" charset="0"/>
+            </a:endParaRPr>
+          </a:p>
+        </p:txBody>
+      </p:sp>
+      <p:sp>
+        <p:nvSpPr>
+          <p:cNvPr id="4" name="Symbol zastępczy zawartości 2">
+            <a:extLst>
+              <a:ext uri="{FF2B5EF4-FFF2-40B4-BE49-F238E27FC236}">
+                <a16:creationId xmlns:a16="http://schemas.microsoft.com/office/drawing/2014/main" id="{60D41FE0-5035-4C08-8F3E-72067F6655A5}"/>
+              </a:ext>
+            </a:extLst>
+          </p:cNvPr>
+          <p:cNvSpPr>
+            <a:spLocks noGrp="1"/>
+          </p:cNvSpPr>
+          <p:nvPr>
+            <p:ph idx="1"/>
+          </p:nvPr>
+        </p:nvSpPr>
+        <p:spPr>
+          <a:xfrm>
+            <a:off x="492369" y="1477566"/>
+            <a:ext cx="10480431" cy="4604709"/>
+          </a:xfrm>
+        </p:spPr>
+        <p:txBody>
+          <a:bodyPr>
+            <a:normAutofit/>
+          </a:bodyPr>
+          <a:lstStyle/>
+          <a:p>
+            <a:pPr algn="just"/>
+            <a:r>
+              <a:rPr lang="en-GB" sz="2000" dirty="0"/>
+              <a:t>Better communication with the client</a:t>
+            </a:r>
+          </a:p>
+          <a:p>
+            <a:pPr algn="just"/>
+            <a:r>
+              <a:rPr lang="en-GB" sz="2000" dirty="0"/>
+              <a:t>Better inter-team communication</a:t>
+            </a:r>
+          </a:p>
+          <a:p>
+            <a:pPr algn="just"/>
+            <a:r>
+              <a:rPr lang="en-GB" sz="2000" dirty="0"/>
+              <a:t>More detailed description of working processes</a:t>
+            </a:r>
+          </a:p>
+          <a:p>
+            <a:pPr algn="just"/>
+            <a:r>
+              <a:rPr lang="en-GB" sz="2000" dirty="0"/>
+              <a:t>Better software development methodologies</a:t>
+            </a:r>
+          </a:p>
+          <a:p>
+            <a:pPr marL="0" indent="0" algn="just">
+              <a:buNone/>
+            </a:pPr>
+            <a:endParaRPr lang="en-GB" sz="2000" dirty="0"/>
+          </a:p>
+          <a:p>
+            <a:pPr algn="just"/>
+            <a:endParaRPr lang="en-GB" sz="2000" dirty="0"/>
+          </a:p>
+        </p:txBody>
+      </p:sp>
+    </p:spTree>
+    <p:extLst>
+      <p:ext uri="{BB962C8B-B14F-4D97-AF65-F5344CB8AC3E}">
+        <p14:creationId xmlns:p14="http://schemas.microsoft.com/office/powerpoint/2010/main" val="521077491"/>
+      </p:ext>
+    </p:extLst>
+  </p:cSld>
+  <p:clrMapOvr>
+    <a:masterClrMapping/>
+  </p:clrMapOvr>
+</p:sld>
+</file>
+
+<file path=ppt/slides/slide12.xml><?xml version="1.0" encoding="utf-8"?>
+<p:sld xmlns:a="http://schemas.openxmlformats.org/drawingml/2006/main" xmlns:r="http://schemas.openxmlformats.org/officeDocument/2006/relationships" xmlns:p="http://schemas.openxmlformats.org/presentationml/2006/main">
+  <p:cSld>
+    <p:bg>
+      <p:bgPr>
+        <a:gradFill flip="none" rotWithShape="1">
+          <a:gsLst>
+            <a:gs pos="0">
+              <a:schemeClr val="accent3">
+                <a:lumMod val="0"/>
+                <a:lumOff val="100000"/>
+              </a:schemeClr>
+            </a:gs>
+            <a:gs pos="35000">
+              <a:schemeClr val="accent3">
+                <a:lumMod val="0"/>
+                <a:lumOff val="100000"/>
+              </a:schemeClr>
+            </a:gs>
+            <a:gs pos="100000">
+              <a:schemeClr val="accent3">
+                <a:lumMod val="100000"/>
+              </a:schemeClr>
+            </a:gs>
+          </a:gsLst>
+          <a:path path="circle">
+            <a:fillToRect l="50000" t="-80000" r="50000" b="180000"/>
+          </a:path>
+          <a:tileRect/>
+        </a:gradFill>
+        <a:effectLst/>
+      </p:bgPr>
+    </p:bg>
+    <p:spTree>
+      <p:nvGrpSpPr>
+        <p:cNvPr id="1" name=""/>
+        <p:cNvGrpSpPr/>
+        <p:nvPr/>
+      </p:nvGrpSpPr>
+      <p:grpSpPr>
+        <a:xfrm>
+          <a:off x="0" y="0"/>
+          <a:ext cx="0" cy="0"/>
+          <a:chOff x="0" y="0"/>
+          <a:chExt cx="0" cy="0"/>
+        </a:xfrm>
+      </p:grpSpPr>
+      <p:sp>
+        <p:nvSpPr>
+          <p:cNvPr id="2" name="Tytuł 1">
+            <a:extLst>
+              <a:ext uri="{FF2B5EF4-FFF2-40B4-BE49-F238E27FC236}">
+                <a16:creationId xmlns:a16="http://schemas.microsoft.com/office/drawing/2014/main" id="{9C072613-9DB4-4BA4-996A-DCC73A6F36BF}"/>
+              </a:ext>
+            </a:extLst>
+          </p:cNvPr>
+          <p:cNvSpPr>
+            <a:spLocks noGrp="1"/>
+          </p:cNvSpPr>
+          <p:nvPr>
+            <p:ph type="title"/>
+          </p:nvPr>
+        </p:nvSpPr>
+        <p:spPr>
+          <a:xfrm>
+            <a:off x="713232" y="1940312"/>
+            <a:ext cx="9692640" cy="2151469"/>
+          </a:xfrm>
+        </p:spPr>
+        <p:txBody>
+          <a:bodyPr>
+            <a:normAutofit/>
+          </a:bodyPr>
+          <a:lstStyle/>
+          <a:p>
+            <a:pPr algn="ctr"/>
+            <a:r>
+              <a:rPr lang="en-GB" sz="9600" dirty="0">
+                <a:latin typeface="Impact" panose="020B0806030902050204" pitchFamily="34" charset="0"/>
+              </a:rPr>
+              <a:t>Questions?</a:t>
+            </a:r>
+            <a:endParaRPr lang="pl-PL" sz="9600" dirty="0">
+              <a:latin typeface="Impact" panose="020B0806030902050204" pitchFamily="34" charset="0"/>
+            </a:endParaRPr>
+          </a:p>
+        </p:txBody>
+      </p:sp>
+    </p:spTree>
+    <p:extLst>
+      <p:ext uri="{BB962C8B-B14F-4D97-AF65-F5344CB8AC3E}">
+        <p14:creationId xmlns:p14="http://schemas.microsoft.com/office/powerpoint/2010/main" val="189222166"/>
+      </p:ext>
+    </p:extLst>
+  </p:cSld>
+  <p:clrMapOvr>
+    <a:masterClrMapping/>
+  </p:clrMapOvr>
+</p:sld>
+</file>
+
+<file path=ppt/slides/slide13.xml><?xml version="1.0" encoding="utf-8"?>
+<p:sld xmlns:a="http://schemas.openxmlformats.org/drawingml/2006/main" xmlns:r="http://schemas.openxmlformats.org/officeDocument/2006/relationships" xmlns:p="http://schemas.openxmlformats.org/presentationml/2006/main">
+  <p:cSld>
+    <p:bg>
+      <p:bgPr>
+        <a:solidFill>
+          <a:schemeClr val="bg1"/>
+        </a:solidFill>
+        <a:effectLst/>
+      </p:bgPr>
+    </p:bg>
+    <p:spTree>
+      <p:nvGrpSpPr>
+        <p:cNvPr id="1" name=""/>
+        <p:cNvGrpSpPr/>
+        <p:nvPr/>
+      </p:nvGrpSpPr>
+      <p:grpSpPr>
+        <a:xfrm>
+          <a:off x="0" y="0"/>
+          <a:ext cx="0" cy="0"/>
+          <a:chOff x="0" y="0"/>
+          <a:chExt cx="0" cy="0"/>
+        </a:xfrm>
+      </p:grpSpPr>
+      <p:sp>
+        <p:nvSpPr>
+          <p:cNvPr id="2" name="Tytuł 1">
+            <a:extLst>
+              <a:ext uri="{FF2B5EF4-FFF2-40B4-BE49-F238E27FC236}">
+                <a16:creationId xmlns:a16="http://schemas.microsoft.com/office/drawing/2014/main" id="{7647B742-C9E2-4634-94FE-4E12CFD24A76}"/>
+              </a:ext>
+            </a:extLst>
+          </p:cNvPr>
+          <p:cNvSpPr>
+            <a:spLocks noGrp="1"/>
+          </p:cNvSpPr>
+          <p:nvPr>
+            <p:ph type="title"/>
+          </p:nvPr>
+        </p:nvSpPr>
+        <p:spPr>
+          <a:xfrm>
+            <a:off x="-984939" y="152819"/>
+            <a:ext cx="9692640" cy="1325562"/>
+          </a:xfrm>
+        </p:spPr>
+        <p:txBody>
+          <a:bodyPr>
+            <a:normAutofit/>
+          </a:bodyPr>
+          <a:lstStyle/>
+          <a:p>
+            <a:pPr algn="ctr"/>
+            <a:r>
+              <a:rPr lang="pl-PL" sz="5400" dirty="0">
+                <a:latin typeface="Freestyle Script" panose="030804020302050B0404" pitchFamily="66" charset="0"/>
+              </a:rPr>
+              <a:t>MAIN POINTS TO CONSIDER</a:t>
+            </a:r>
+          </a:p>
+        </p:txBody>
+      </p:sp>
+      <p:sp>
+        <p:nvSpPr>
+          <p:cNvPr id="3" name="Symbol zastępczy zawartości 2">
+            <a:extLst>
+              <a:ext uri="{FF2B5EF4-FFF2-40B4-BE49-F238E27FC236}">
+                <a16:creationId xmlns:a16="http://schemas.microsoft.com/office/drawing/2014/main" id="{25A00203-4B8E-4C44-9273-412B98949066}"/>
+              </a:ext>
+            </a:extLst>
+          </p:cNvPr>
+          <p:cNvSpPr>
+            <a:spLocks noGrp="1"/>
+          </p:cNvSpPr>
+          <p:nvPr>
+            <p:ph idx="1"/>
+          </p:nvPr>
+        </p:nvSpPr>
+        <p:spPr>
+          <a:xfrm>
+            <a:off x="1440002" y="1816924"/>
+            <a:ext cx="8595360" cy="4351337"/>
+          </a:xfrm>
+        </p:spPr>
+        <p:txBody>
+          <a:bodyPr/>
+          <a:lstStyle/>
+          <a:p>
+            <a:endParaRPr lang="pl-PL" dirty="0"/>
+          </a:p>
+          <a:p>
+            <a:pPr marL="0" indent="0">
+              <a:buNone/>
+            </a:pPr>
+            <a:endParaRPr lang="pl-PL" dirty="0"/>
+          </a:p>
+          <a:p>
+            <a:pPr marL="0" indent="0">
+              <a:buNone/>
+            </a:pPr>
+            <a:endParaRPr lang="pl-PL" dirty="0"/>
+          </a:p>
+        </p:txBody>
+      </p:sp>
+      <p:sp>
+        <p:nvSpPr>
+          <p:cNvPr id="4" name="Prostokąt 3">
+            <a:extLst>
+              <a:ext uri="{FF2B5EF4-FFF2-40B4-BE49-F238E27FC236}">
+                <a16:creationId xmlns:a16="http://schemas.microsoft.com/office/drawing/2014/main" id="{C69C9B83-2210-44A8-B190-3B667001C592}"/>
+              </a:ext>
+            </a:extLst>
+          </p:cNvPr>
+          <p:cNvSpPr/>
+          <p:nvPr/>
+        </p:nvSpPr>
+        <p:spPr>
+          <a:xfrm>
+            <a:off x="659001" y="1816924"/>
+            <a:ext cx="6096000" cy="4384983"/>
+          </a:xfrm>
+          <a:prstGeom prst="rect">
+            <a:avLst/>
+          </a:prstGeom>
+        </p:spPr>
+        <p:txBody>
+          <a:bodyPr>
+            <a:spAutoFit/>
+          </a:bodyPr>
+          <a:lstStyle/>
+          <a:p>
+            <a:pPr lvl="0" algn="ctr" defTabSz="914400">
+              <a:lnSpc>
+                <a:spcPct val="150000"/>
+              </a:lnSpc>
+              <a:spcBef>
+                <a:spcPts val="1400"/>
+              </a:spcBef>
+              <a:spcAft>
+                <a:spcPts val="200"/>
+              </a:spcAft>
+              <a:buClr>
+                <a:srgbClr val="6F6F74"/>
+              </a:buClr>
+              <a:buSzPct val="80000"/>
+            </a:pPr>
+            <a:r>
+              <a:rPr lang="pl-PL" sz="2400" spc="10" dirty="0">
+                <a:solidFill>
+                  <a:srgbClr val="000000"/>
+                </a:solidFill>
+                <a:latin typeface="Carlito" panose="020F0502020204030204" pitchFamily="34" charset="0"/>
+                <a:cs typeface="Carlito" panose="020F0502020204030204" pitchFamily="34" charset="0"/>
+              </a:rPr>
+              <a:t>Hardware need</a:t>
+            </a:r>
+            <a:r>
+              <a:rPr lang="en-GB" sz="2400" spc="10" dirty="0">
+                <a:solidFill>
+                  <a:srgbClr val="000000"/>
+                </a:solidFill>
+                <a:latin typeface="Carlito" panose="020F0502020204030204" pitchFamily="34" charset="0"/>
+                <a:cs typeface="Carlito" panose="020F0502020204030204" pitchFamily="34" charset="0"/>
+              </a:rPr>
+              <a:t>ed </a:t>
+            </a:r>
+          </a:p>
+          <a:p>
+            <a:pPr lvl="0" algn="ctr" defTabSz="914400">
+              <a:lnSpc>
+                <a:spcPct val="150000"/>
+              </a:lnSpc>
+              <a:spcBef>
+                <a:spcPts val="1400"/>
+              </a:spcBef>
+              <a:spcAft>
+                <a:spcPts val="200"/>
+              </a:spcAft>
+              <a:buClr>
+                <a:srgbClr val="6F6F74"/>
+              </a:buClr>
+              <a:buSzPct val="80000"/>
+            </a:pPr>
+            <a:r>
+              <a:rPr lang="en-GB" sz="2400" spc="10" dirty="0">
+                <a:solidFill>
+                  <a:srgbClr val="000000"/>
+                </a:solidFill>
+                <a:latin typeface="Carlito" panose="020F0502020204030204" pitchFamily="34" charset="0"/>
+                <a:cs typeface="Carlito" panose="020F0502020204030204" pitchFamily="34" charset="0"/>
+              </a:rPr>
+              <a:t>Software needed</a:t>
+            </a:r>
+          </a:p>
+          <a:p>
+            <a:pPr lvl="0" algn="ctr" defTabSz="914400">
+              <a:lnSpc>
+                <a:spcPct val="150000"/>
+              </a:lnSpc>
+              <a:spcBef>
+                <a:spcPts val="1400"/>
+              </a:spcBef>
+              <a:spcAft>
+                <a:spcPts val="200"/>
+              </a:spcAft>
+              <a:buClr>
+                <a:srgbClr val="6F6F74"/>
+              </a:buClr>
+              <a:buSzPct val="80000"/>
+            </a:pPr>
+            <a:r>
+              <a:rPr lang="en-GB" sz="2400" spc="10" dirty="0">
+                <a:solidFill>
+                  <a:srgbClr val="000000"/>
+                </a:solidFill>
+                <a:latin typeface="Carlito" panose="020F0502020204030204" pitchFamily="34" charset="0"/>
+                <a:cs typeface="Carlito" panose="020F0502020204030204" pitchFamily="34" charset="0"/>
+              </a:rPr>
+              <a:t>Plant needed </a:t>
+            </a:r>
+          </a:p>
+          <a:p>
+            <a:pPr lvl="0" algn="ctr" defTabSz="914400">
+              <a:lnSpc>
+                <a:spcPct val="150000"/>
+              </a:lnSpc>
+              <a:spcBef>
+                <a:spcPts val="1400"/>
+              </a:spcBef>
+              <a:spcAft>
+                <a:spcPts val="200"/>
+              </a:spcAft>
+              <a:buClr>
+                <a:srgbClr val="6F6F74"/>
+              </a:buClr>
+              <a:buSzPct val="80000"/>
+            </a:pPr>
+            <a:r>
+              <a:rPr lang="en-GB" sz="2400" spc="10" dirty="0">
+                <a:solidFill>
+                  <a:srgbClr val="000000"/>
+                </a:solidFill>
+                <a:latin typeface="Carlito" panose="020F0502020204030204" pitchFamily="34" charset="0"/>
+                <a:cs typeface="Carlito" panose="020F0502020204030204" pitchFamily="34" charset="0"/>
+              </a:rPr>
+              <a:t>Time needed</a:t>
+            </a:r>
+          </a:p>
+          <a:p>
+            <a:pPr lvl="0" algn="ctr" defTabSz="914400">
+              <a:lnSpc>
+                <a:spcPct val="150000"/>
+              </a:lnSpc>
+              <a:spcBef>
+                <a:spcPts val="1400"/>
+              </a:spcBef>
+              <a:spcAft>
+                <a:spcPts val="200"/>
+              </a:spcAft>
+              <a:buClr>
+                <a:srgbClr val="6F6F74"/>
+              </a:buClr>
+              <a:buSzPct val="80000"/>
+            </a:pPr>
+            <a:r>
+              <a:rPr lang="en-GB" sz="2400" spc="10" dirty="0">
+                <a:solidFill>
+                  <a:srgbClr val="000000"/>
+                </a:solidFill>
+                <a:latin typeface="Carlito" panose="020F0502020204030204" pitchFamily="34" charset="0"/>
+                <a:cs typeface="Carlito" panose="020F0502020204030204" pitchFamily="34" charset="0"/>
+              </a:rPr>
+              <a:t>Power source</a:t>
+            </a:r>
+          </a:p>
+          <a:p>
+            <a:pPr lvl="0" algn="ctr" defTabSz="914400">
+              <a:lnSpc>
+                <a:spcPct val="150000"/>
+              </a:lnSpc>
+              <a:spcBef>
+                <a:spcPts val="1400"/>
+              </a:spcBef>
+              <a:spcAft>
+                <a:spcPts val="200"/>
+              </a:spcAft>
+              <a:buClr>
+                <a:srgbClr val="6F6F74"/>
+              </a:buClr>
+              <a:buSzPct val="80000"/>
+            </a:pPr>
+            <a:r>
+              <a:rPr lang="en-GB" sz="2400" spc="10" dirty="0">
+                <a:solidFill>
+                  <a:srgbClr val="000000"/>
+                </a:solidFill>
+                <a:latin typeface="Carlito" panose="020F0502020204030204" pitchFamily="34" charset="0"/>
+                <a:cs typeface="Carlito" panose="020F0502020204030204" pitchFamily="34" charset="0"/>
+              </a:rPr>
+              <a:t>Data Storage regulations</a:t>
+            </a:r>
+          </a:p>
+        </p:txBody>
+      </p:sp>
+      <p:pic>
+        <p:nvPicPr>
+          <p:cNvPr id="5" name="Obraz 4">
+            <a:extLst>
+              <a:ext uri="{FF2B5EF4-FFF2-40B4-BE49-F238E27FC236}">
+                <a16:creationId xmlns:a16="http://schemas.microsoft.com/office/drawing/2014/main" id="{81014F91-9FFA-497F-BF70-9F38B6FA35D3}"/>
+              </a:ext>
+            </a:extLst>
+          </p:cNvPr>
+          <p:cNvPicPr>
+            <a:picLocks noChangeAspect="1"/>
+          </p:cNvPicPr>
+          <p:nvPr/>
+        </p:nvPicPr>
+        <p:blipFill>
+          <a:blip r:embed="rId2"/>
+          <a:stretch>
+            <a:fillRect/>
+          </a:stretch>
+        </p:blipFill>
+        <p:spPr>
+          <a:xfrm>
+            <a:off x="7481455" y="0"/>
+            <a:ext cx="4710545" cy="6858000"/>
+          </a:xfrm>
+          <a:prstGeom prst="rect">
+            <a:avLst/>
+          </a:prstGeom>
+        </p:spPr>
+      </p:pic>
+    </p:spTree>
+    <p:extLst>
+      <p:ext uri="{BB962C8B-B14F-4D97-AF65-F5344CB8AC3E}">
+        <p14:creationId xmlns:p14="http://schemas.microsoft.com/office/powerpoint/2010/main" val="1946838235"/>
+      </p:ext>
+    </p:extLst>
+  </p:cSld>
+  <p:clrMapOvr>
+    <a:masterClrMapping/>
+  </p:clrMapOvr>
+</p:sld>
+</file>
+
+<file path=ppt/slides/slide14.xml><?xml version="1.0" encoding="utf-8"?>
+<p:sld xmlns:a="http://schemas.openxmlformats.org/drawingml/2006/main" xmlns:r="http://schemas.openxmlformats.org/officeDocument/2006/relationships" xmlns:p="http://schemas.openxmlformats.org/presentationml/2006/main">
+  <p:cSld>
+    <p:spTree>
+      <p:nvGrpSpPr>
+        <p:cNvPr id="1" name=""/>
+        <p:cNvGrpSpPr/>
+        <p:nvPr/>
+      </p:nvGrpSpPr>
+      <p:grpSpPr>
+        <a:xfrm>
+          <a:off x="0" y="0"/>
+          <a:ext cx="0" cy="0"/>
+          <a:chOff x="0" y="0"/>
+          <a:chExt cx="0" cy="0"/>
+        </a:xfrm>
+      </p:grpSpPr>
+      <p:sp>
+        <p:nvSpPr>
+          <p:cNvPr id="2" name="Tytuł 1">
+            <a:extLst>
+              <a:ext uri="{FF2B5EF4-FFF2-40B4-BE49-F238E27FC236}">
+                <a16:creationId xmlns:a16="http://schemas.microsoft.com/office/drawing/2014/main" id="{C903E5EE-944A-4C21-A11A-E075BA6C199E}"/>
+              </a:ext>
+            </a:extLst>
+          </p:cNvPr>
+          <p:cNvSpPr>
+            <a:spLocks noGrp="1"/>
+          </p:cNvSpPr>
+          <p:nvPr>
+            <p:ph type="title"/>
+          </p:nvPr>
+        </p:nvSpPr>
+        <p:spPr>
+          <a:xfrm>
+            <a:off x="3314284" y="2491562"/>
+            <a:ext cx="5342827" cy="1609344"/>
+          </a:xfrm>
+        </p:spPr>
+        <p:txBody>
+          <a:bodyPr>
+            <a:normAutofit/>
+          </a:bodyPr>
+          <a:lstStyle/>
+          <a:p>
+            <a:r>
+              <a:rPr lang="pl-PL" sz="8000" dirty="0">
+                <a:latin typeface="Freestyle Script" panose="030804020302050B0404" pitchFamily="66" charset="0"/>
+              </a:rPr>
+              <a:t>PROJECT PLAN</a:t>
+            </a:r>
+          </a:p>
+        </p:txBody>
+      </p:sp>
+    </p:spTree>
+    <p:extLst>
+      <p:ext uri="{BB962C8B-B14F-4D97-AF65-F5344CB8AC3E}">
+        <p14:creationId xmlns:p14="http://schemas.microsoft.com/office/powerpoint/2010/main" val="1019001102"/>
+      </p:ext>
+    </p:extLst>
+  </p:cSld>
+  <p:clrMapOvr>
+    <a:masterClrMapping/>
+  </p:clrMapOvr>
+</p:sld>
+</file>
+
+<file path=ppt/slides/slide15.xml><?xml version="1.0" encoding="utf-8"?>
+<p:sld xmlns:a="http://schemas.openxmlformats.org/drawingml/2006/main" xmlns:r="http://schemas.openxmlformats.org/officeDocument/2006/relationships" xmlns:p="http://schemas.openxmlformats.org/presentationml/2006/main">
+  <p:cSld>
+    <p:bg>
+      <p:bgPr>
+        <a:blipFill dpi="0" rotWithShape="1">
+          <a:blip r:embed="rId2">
+            <a:alphaModFix amt="34000"/>
+            <a:lum/>
+          </a:blip>
+          <a:srcRect/>
+          <a:stretch>
+            <a:fillRect t="-9000" b="-9000"/>
+          </a:stretch>
+        </a:blipFill>
+        <a:effectLst/>
+      </p:bgPr>
+    </p:bg>
+    <p:spTree>
+      <p:nvGrpSpPr>
+        <p:cNvPr id="1" name=""/>
+        <p:cNvGrpSpPr/>
+        <p:nvPr/>
+      </p:nvGrpSpPr>
+      <p:grpSpPr>
+        <a:xfrm>
+          <a:off x="0" y="0"/>
+          <a:ext cx="0" cy="0"/>
+          <a:chOff x="0" y="0"/>
+          <a:chExt cx="0" cy="0"/>
+        </a:xfrm>
+      </p:grpSpPr>
+      <p:sp>
+        <p:nvSpPr>
+          <p:cNvPr id="3" name="Prostokąt 2">
+            <a:extLst>
+              <a:ext uri="{FF2B5EF4-FFF2-40B4-BE49-F238E27FC236}">
+                <a16:creationId xmlns:a16="http://schemas.microsoft.com/office/drawing/2014/main" id="{C98A314C-20B7-4152-8B36-2E06A0DCB692}"/>
+              </a:ext>
+            </a:extLst>
+          </p:cNvPr>
+          <p:cNvSpPr/>
+          <p:nvPr/>
+        </p:nvSpPr>
+        <p:spPr>
+          <a:xfrm>
+            <a:off x="2546296" y="453632"/>
+            <a:ext cx="6032421" cy="923330"/>
+          </a:xfrm>
+          <a:prstGeom prst="rect">
+            <a:avLst/>
+          </a:prstGeom>
+        </p:spPr>
+        <p:txBody>
+          <a:bodyPr wrap="none">
+            <a:spAutoFit/>
+          </a:bodyPr>
+          <a:lstStyle/>
+          <a:p>
+            <a:r>
+              <a:rPr lang="en-GB" sz="5400" dirty="0">
+                <a:latin typeface="Freestyle Script" panose="030804020302050B0404" pitchFamily="66" charset="0"/>
+              </a:rPr>
+              <a:t>THE CLIENT IN QUESTION</a:t>
+            </a:r>
+            <a:endParaRPr lang="pl-PL" sz="5400" dirty="0"/>
+          </a:p>
+        </p:txBody>
+      </p:sp>
+    </p:spTree>
+    <p:extLst>
+      <p:ext uri="{BB962C8B-B14F-4D97-AF65-F5344CB8AC3E}">
+        <p14:creationId xmlns:p14="http://schemas.microsoft.com/office/powerpoint/2010/main" val="2430446062"/>
+      </p:ext>
+    </p:extLst>
+  </p:cSld>
+  <p:clrMapOvr>
+    <a:masterClrMapping/>
+  </p:clrMapOvr>
+</p:sld>
+</file>
+
+<file path=ppt/slides/slide16.xml><?xml version="1.0" encoding="utf-8"?>
+<p:sld xmlns:a="http://schemas.openxmlformats.org/drawingml/2006/main" xmlns:r="http://schemas.openxmlformats.org/officeDocument/2006/relationships" xmlns:p="http://schemas.openxmlformats.org/presentationml/2006/main">
+  <p:cSld>
+    <p:spTree>
+      <p:nvGrpSpPr>
+        <p:cNvPr id="1" name=""/>
+        <p:cNvGrpSpPr/>
+        <p:nvPr/>
+      </p:nvGrpSpPr>
+      <p:grpSpPr>
+        <a:xfrm>
+          <a:off x="0" y="0"/>
+          <a:ext cx="0" cy="0"/>
+          <a:chOff x="0" y="0"/>
+          <a:chExt cx="0" cy="0"/>
+        </a:xfrm>
+      </p:grpSpPr>
+      <p:sp>
+        <p:nvSpPr>
+          <p:cNvPr id="2" name="Tytuł 1">
+            <a:extLst>
+              <a:ext uri="{FF2B5EF4-FFF2-40B4-BE49-F238E27FC236}">
+                <a16:creationId xmlns:a16="http://schemas.microsoft.com/office/drawing/2014/main" id="{F504C010-F94B-4350-810F-971B95649743}"/>
+              </a:ext>
+            </a:extLst>
+          </p:cNvPr>
+          <p:cNvSpPr>
+            <a:spLocks noGrp="1"/>
+          </p:cNvSpPr>
+          <p:nvPr>
+            <p:ph type="title"/>
+          </p:nvPr>
+        </p:nvSpPr>
+        <p:spPr>
+          <a:xfrm>
+            <a:off x="7164779" y="0"/>
+            <a:ext cx="2018805" cy="1325562"/>
+          </a:xfrm>
+        </p:spPr>
+        <p:txBody>
+          <a:bodyPr/>
+          <a:lstStyle/>
+          <a:p>
+            <a:r>
+              <a:rPr lang="pl-PL" dirty="0"/>
+              <a:t>Title</a:t>
+            </a:r>
+          </a:p>
+        </p:txBody>
+      </p:sp>
+      <p:pic>
+        <p:nvPicPr>
+          <p:cNvPr id="5" name="Obraz 4">
+            <a:extLst>
+              <a:ext uri="{FF2B5EF4-FFF2-40B4-BE49-F238E27FC236}">
+                <a16:creationId xmlns:a16="http://schemas.microsoft.com/office/drawing/2014/main" id="{ED81202F-9213-4A3B-A119-F870B2CCAA36}"/>
+              </a:ext>
+            </a:extLst>
+          </p:cNvPr>
+          <p:cNvPicPr>
+            <a:picLocks noChangeAspect="1"/>
+          </p:cNvPicPr>
+          <p:nvPr/>
+        </p:nvPicPr>
+        <p:blipFill>
+          <a:blip r:embed="rId2"/>
+          <a:stretch>
+            <a:fillRect/>
+          </a:stretch>
+        </p:blipFill>
+        <p:spPr>
+          <a:xfrm>
+            <a:off x="0" y="0"/>
+            <a:ext cx="4573758" cy="6858000"/>
+          </a:xfrm>
+          <a:prstGeom prst="rect">
+            <a:avLst/>
+          </a:prstGeom>
+        </p:spPr>
+      </p:pic>
+    </p:spTree>
+    <p:extLst>
+      <p:ext uri="{BB962C8B-B14F-4D97-AF65-F5344CB8AC3E}">
+        <p14:creationId xmlns:p14="http://schemas.microsoft.com/office/powerpoint/2010/main" val="2668043665"/>
+      </p:ext>
+    </p:extLst>
+  </p:cSld>
+  <p:clrMapOvr>
+    <a:masterClrMapping/>
+  </p:clrMapOvr>
+</p:sld>
+</file>
+
+<file path=ppt/slides/slide17.xml><?xml version="1.0" encoding="utf-8"?>
+<p:sld xmlns:a="http://schemas.openxmlformats.org/drawingml/2006/main" xmlns:r="http://schemas.openxmlformats.org/officeDocument/2006/relationships" xmlns:p="http://schemas.openxmlformats.org/presentationml/2006/main">
+  <p:cSld>
+    <p:bg>
+      <p:bgPr>
+        <a:blipFill dpi="0" rotWithShape="1">
+          <a:blip r:embed="rId2">
+            <a:alphaModFix amt="21000"/>
+            <a:lum/>
+          </a:blip>
+          <a:srcRect/>
+          <a:stretch>
+            <a:fillRect t="-9000" b="-9000"/>
+          </a:stretch>
+        </a:blipFill>
+        <a:effectLst/>
+      </p:bgPr>
+    </p:bg>
+    <p:spTree>
+      <p:nvGrpSpPr>
+        <p:cNvPr id="1" name=""/>
+        <p:cNvGrpSpPr/>
+        <p:nvPr/>
+      </p:nvGrpSpPr>
+      <p:grpSpPr>
+        <a:xfrm>
+          <a:off x="0" y="0"/>
+          <a:ext cx="0" cy="0"/>
+          <a:chOff x="0" y="0"/>
+          <a:chExt cx="0" cy="0"/>
+        </a:xfrm>
+      </p:grpSpPr>
+      <p:sp>
+        <p:nvSpPr>
+          <p:cNvPr id="2" name="Tytuł 1">
+            <a:extLst>
+              <a:ext uri="{FF2B5EF4-FFF2-40B4-BE49-F238E27FC236}">
+                <a16:creationId xmlns:a16="http://schemas.microsoft.com/office/drawing/2014/main" id="{96B2E78B-42FC-4DF9-9AC2-AED569C67747}"/>
+              </a:ext>
+            </a:extLst>
+          </p:cNvPr>
+          <p:cNvSpPr>
+            <a:spLocks noGrp="1"/>
+          </p:cNvSpPr>
+          <p:nvPr>
+            <p:ph type="title"/>
+          </p:nvPr>
+        </p:nvSpPr>
+        <p:spPr/>
+        <p:txBody>
+          <a:bodyPr/>
+          <a:lstStyle/>
+          <a:p>
+            <a:endParaRPr lang="pl-PL"/>
+          </a:p>
+        </p:txBody>
+      </p:sp>
+    </p:spTree>
+    <p:extLst>
+      <p:ext uri="{BB962C8B-B14F-4D97-AF65-F5344CB8AC3E}">
+        <p14:creationId xmlns:p14="http://schemas.microsoft.com/office/powerpoint/2010/main" val="2887637246"/>
+      </p:ext>
+    </p:extLst>
+  </p:cSld>
+  <p:clrMapOvr>
+    <a:masterClrMapping/>
+  </p:clrMapOvr>
+</p:sld>
+</file>
+
+<file path=ppt/slides/slide18.xml><?xml version="1.0" encoding="utf-8"?>
+<p:sld xmlns:a="http://schemas.openxmlformats.org/drawingml/2006/main" xmlns:r="http://schemas.openxmlformats.org/officeDocument/2006/relationships" xmlns:p="http://schemas.openxmlformats.org/presentationml/2006/main">
+  <p:cSld>
+    <p:bg>
+      <p:bgPr>
+        <a:blipFill dpi="0" rotWithShape="1">
+          <a:blip r:embed="rId2">
+            <a:alphaModFix amt="21000"/>
+            <a:lum/>
+          </a:blip>
+          <a:srcRect/>
+          <a:stretch>
+            <a:fillRect t="-9000" b="-9000"/>
+          </a:stretch>
+        </a:blipFill>
+        <a:effectLst/>
+      </p:bgPr>
+    </p:bg>
+    <p:spTree>
+      <p:nvGrpSpPr>
+        <p:cNvPr id="1" name=""/>
+        <p:cNvGrpSpPr/>
+        <p:nvPr/>
+      </p:nvGrpSpPr>
+      <p:grpSpPr>
+        <a:xfrm>
+          <a:off x="0" y="0"/>
+          <a:ext cx="0" cy="0"/>
+          <a:chOff x="0" y="0"/>
+          <a:chExt cx="0" cy="0"/>
+        </a:xfrm>
+      </p:grpSpPr>
+      <p:sp>
+        <p:nvSpPr>
+          <p:cNvPr id="2" name="Tytuł 1">
+            <a:extLst>
+              <a:ext uri="{FF2B5EF4-FFF2-40B4-BE49-F238E27FC236}">
+                <a16:creationId xmlns:a16="http://schemas.microsoft.com/office/drawing/2014/main" id="{4BA4F6CA-9825-4EFA-B11E-2EE58F527A8D}"/>
+              </a:ext>
+            </a:extLst>
+          </p:cNvPr>
+          <p:cNvSpPr>
+            <a:spLocks noGrp="1"/>
+          </p:cNvSpPr>
+          <p:nvPr>
+            <p:ph type="title"/>
+          </p:nvPr>
+        </p:nvSpPr>
+        <p:spPr/>
+        <p:txBody>
+          <a:bodyPr/>
+          <a:lstStyle/>
+          <a:p>
+            <a:endParaRPr lang="pl-PL"/>
+          </a:p>
+        </p:txBody>
+      </p:sp>
+    </p:spTree>
+    <p:extLst>
+      <p:ext uri="{BB962C8B-B14F-4D97-AF65-F5344CB8AC3E}">
+        <p14:creationId xmlns:p14="http://schemas.microsoft.com/office/powerpoint/2010/main" val="4107810988"/>
+      </p:ext>
+    </p:extLst>
+  </p:cSld>
+  <p:clrMapOvr>
+    <a:masterClrMapping/>
+  </p:clrMapOvr>
+</p:sld>
+</file>
+
+<file path=ppt/slides/slide19.xml><?xml version="1.0" encoding="utf-8"?>
+<p:sld xmlns:a="http://schemas.openxmlformats.org/drawingml/2006/main" xmlns:r="http://schemas.openxmlformats.org/officeDocument/2006/relationships" xmlns:p="http://schemas.openxmlformats.org/presentationml/2006/main">
+  <p:cSld>
+    <p:bg>
+      <p:bgPr>
+        <a:blipFill dpi="0" rotWithShape="1">
+          <a:blip r:embed="rId2">
+            <a:alphaModFix amt="37000"/>
+            <a:lum/>
+          </a:blip>
+          <a:srcRect/>
+          <a:stretch>
+            <a:fillRect t="-9000" b="-9000"/>
+          </a:stretch>
+        </a:blipFill>
+        <a:effectLst/>
+      </p:bgPr>
+    </p:bg>
+    <p:spTree>
+      <p:nvGrpSpPr>
+        <p:cNvPr id="1" name=""/>
+        <p:cNvGrpSpPr/>
+        <p:nvPr/>
+      </p:nvGrpSpPr>
+      <p:grpSpPr>
+        <a:xfrm>
+          <a:off x="0" y="0"/>
+          <a:ext cx="0" cy="0"/>
+          <a:chOff x="0" y="0"/>
+          <a:chExt cx="0" cy="0"/>
+        </a:xfrm>
+      </p:grpSpPr>
+      <p:sp>
+        <p:nvSpPr>
+          <p:cNvPr id="2" name="Tytuł 1">
+            <a:extLst>
+              <a:ext uri="{FF2B5EF4-FFF2-40B4-BE49-F238E27FC236}">
+                <a16:creationId xmlns:a16="http://schemas.microsoft.com/office/drawing/2014/main" id="{8942A8F2-9E3F-4979-96C5-DA755166377F}"/>
+              </a:ext>
+            </a:extLst>
+          </p:cNvPr>
+          <p:cNvSpPr>
+            <a:spLocks noGrp="1"/>
+          </p:cNvSpPr>
+          <p:nvPr>
+            <p:ph type="title"/>
+          </p:nvPr>
+        </p:nvSpPr>
+        <p:spPr>
+          <a:xfrm>
+            <a:off x="181217" y="5151517"/>
+            <a:ext cx="9692640" cy="1325562"/>
+          </a:xfrm>
+        </p:spPr>
+        <p:txBody>
+          <a:bodyPr>
+            <a:normAutofit/>
+          </a:bodyPr>
+          <a:lstStyle/>
+          <a:p>
+            <a:r>
+              <a:rPr lang="pl-PL" sz="8000" dirty="0">
+                <a:latin typeface="Freestyle Script" panose="030804020302050B0404" pitchFamily="66" charset="0"/>
+              </a:rPr>
+              <a:t>Thank you for attention</a:t>
+            </a:r>
+          </a:p>
+        </p:txBody>
+      </p:sp>
+    </p:spTree>
+    <p:extLst>
+      <p:ext uri="{BB962C8B-B14F-4D97-AF65-F5344CB8AC3E}">
+        <p14:creationId xmlns:p14="http://schemas.microsoft.com/office/powerpoint/2010/main" val="2766135950"/>
       </p:ext>
     </p:extLst>
   </p:cSld>
@@ -17431,48 +19191,47 @@
             <p:ph type="ctrTitle"/>
           </p:nvPr>
         </p:nvSpPr>
-        <p:spPr/>
+        <p:spPr>
+          <a:xfrm>
+            <a:off x="1078522" y="411474"/>
+            <a:ext cx="10318418" cy="4394988"/>
+          </a:xfrm>
+        </p:spPr>
         <p:txBody>
           <a:bodyPr/>
           <a:lstStyle/>
           <a:p>
             <a:r>
-              <a:rPr lang="pl-PL" sz="7200" b="1" dirty="0">
-                <a:latin typeface="Freestyle Script" panose="030804020302050B0404" pitchFamily="66" charset="0"/>
+              <a:rPr lang="pl-PL" sz="7200" dirty="0">
+                <a:latin typeface="Impact" panose="020B0806030902050204" pitchFamily="34" charset="0"/>
               </a:rPr>
               <a:t>Smart</a:t>
             </a:r>
             <a:br>
-              <a:rPr lang="pl-PL" sz="7200" b="1" dirty="0">
-                <a:latin typeface="Freestyle Script" panose="030804020302050B0404" pitchFamily="66" charset="0"/>
+              <a:rPr lang="pl-PL" sz="7200" dirty="0">
+                <a:latin typeface="Impact" panose="020B0806030902050204" pitchFamily="34" charset="0"/>
               </a:rPr>
             </a:br>
             <a:r>
-              <a:rPr lang="pl-PL" sz="7200" b="1" dirty="0">
-                <a:latin typeface="Freestyle Script" panose="030804020302050B0404" pitchFamily="66" charset="0"/>
+              <a:rPr lang="pl-PL" sz="7200" dirty="0">
+                <a:latin typeface="Impact" panose="020B0806030902050204" pitchFamily="34" charset="0"/>
               </a:rPr>
               <a:t> eco system</a:t>
             </a:r>
             <a:br>
-              <a:rPr lang="pl-PL" sz="7200" b="1" dirty="0">
-                <a:latin typeface="Freestyle Script" panose="030804020302050B0404" pitchFamily="66" charset="0"/>
+              <a:rPr lang="pl-PL" sz="7200" dirty="0">
+                <a:latin typeface="Impact" panose="020B0806030902050204" pitchFamily="34" charset="0"/>
               </a:rPr>
             </a:br>
             <a:r>
-              <a:rPr lang="pl-PL" sz="7200" b="1" dirty="0">
-                <a:latin typeface="Freestyle Script" panose="030804020302050B0404" pitchFamily="66" charset="0"/>
-              </a:rPr>
-              <a:t>- </a:t>
-            </a:r>
-            <a:r>
-              <a:rPr lang="en-GB" sz="7200" b="1" dirty="0">
-                <a:latin typeface="Freestyle Script" panose="030804020302050B0404" pitchFamily="66" charset="0"/>
+              <a:rPr lang="en-GB" sz="7200" dirty="0">
+                <a:latin typeface="Impact" panose="020B0806030902050204" pitchFamily="34" charset="0"/>
               </a:rPr>
               <a:t>client</a:t>
             </a:r>
             <a:r>
-              <a:rPr lang="pl-PL" sz="7200" b="1" dirty="0">
-                <a:latin typeface="Freestyle Script" panose="030804020302050B0404" pitchFamily="66" charset="0"/>
+              <a:rPr lang="pl-PL" sz="7200" dirty="0">
+                <a:latin typeface="Impact" panose="020B0806030902050204" pitchFamily="34" charset="0"/>
               </a:rPr>
               <a:t> pitch</a:t>
             </a:r>
@@ -17497,41 +19256,33 @@
         </p:nvSpPr>
         <p:spPr>
           <a:xfrm>
-            <a:off x="2215045" y="5493375"/>
-            <a:ext cx="8045373" cy="1441173"/>
+            <a:off x="2215045" y="4806462"/>
+            <a:ext cx="8045373" cy="2128088"/>
           </a:xfrm>
         </p:spPr>
         <p:txBody>
           <a:bodyPr>
-            <a:normAutofit lnSpcReduction="10000"/>
+            <a:normAutofit/>
           </a:bodyPr>
           <a:lstStyle/>
           <a:p>
-            <a:endParaRPr lang="pl-PL" b="0" dirty="0">
-              <a:latin typeface="Freestyle Script" panose="030804020302050B0404" pitchFamily="66" charset="0"/>
-            </a:endParaRPr>
-          </a:p>
-          <a:p>
-            <a:r>
-              <a:rPr lang="pl-PL" dirty="0">
-                <a:latin typeface="Freestyle Script" panose="030804020302050B0404" pitchFamily="66" charset="0"/>
-              </a:rPr>
+            <a:endParaRPr lang="pl-PL" sz="2400" b="0" dirty="0"/>
+          </a:p>
+          <a:p>
+            <a:r>
+              <a:rPr lang="pl-PL" sz="2400" dirty="0"/>
               <a:t>Prepared By TEAM DDNS</a:t>
             </a:r>
           </a:p>
           <a:p>
             <a:r>
-              <a:rPr lang="pl-PL" sz="1600" b="0" dirty="0">
-                <a:latin typeface="Freestyle Script" panose="030804020302050B0404" pitchFamily="66" charset="0"/>
-              </a:rPr>
+              <a:rPr lang="pl-PL" sz="1800" b="0" dirty="0"/>
               <a:t>Dorota marczak, nader sobhi, Declan bell and scott allan</a:t>
             </a:r>
           </a:p>
           <a:p>
             <a:r>
-              <a:rPr lang="pl-PL" sz="1800" b="0" dirty="0">
-                <a:latin typeface="Freestyle Script" panose="030804020302050B0404" pitchFamily="66" charset="0"/>
-              </a:rPr>
+              <a:rPr lang="pl-PL" b="0" dirty="0"/>
               <a:t> 23.10.2018 </a:t>
             </a:r>
           </a:p>
@@ -17553,86 +19304,33 @@
 <file path=ppt/slides/slide3.xml><?xml version="1.0" encoding="utf-8"?>
 <p:sld xmlns:a="http://schemas.openxmlformats.org/drawingml/2006/main" xmlns:r="http://schemas.openxmlformats.org/officeDocument/2006/relationships" xmlns:p="http://schemas.openxmlformats.org/presentationml/2006/main">
   <p:cSld>
-    <p:spTree>
-      <p:nvGrpSpPr>
-        <p:cNvPr id="1" name=""/>
-        <p:cNvGrpSpPr/>
-        <p:nvPr/>
-      </p:nvGrpSpPr>
-      <p:grpSpPr>
-        <a:xfrm>
-          <a:off x="0" y="0"/>
-          <a:ext cx="0" cy="0"/>
-          <a:chOff x="0" y="0"/>
-          <a:chExt cx="0" cy="0"/>
-        </a:xfrm>
-      </p:grpSpPr>
-      <p:sp>
-        <p:nvSpPr>
-          <p:cNvPr id="2" name="Tytuł 1">
-            <a:extLst>
-              <a:ext uri="{FF2B5EF4-FFF2-40B4-BE49-F238E27FC236}">
-                <a16:creationId xmlns:a16="http://schemas.microsoft.com/office/drawing/2014/main" id="{0FA35352-C52F-4ED4-A748-574B245CC6C5}"/>
-              </a:ext>
-            </a:extLst>
-          </p:cNvPr>
-          <p:cNvSpPr>
-            <a:spLocks noGrp="1"/>
-          </p:cNvSpPr>
-          <p:nvPr>
-            <p:ph type="title"/>
-          </p:nvPr>
-        </p:nvSpPr>
-        <p:spPr>
-          <a:xfrm>
-            <a:off x="1006839" y="2291049"/>
-            <a:ext cx="10178322" cy="1492132"/>
-          </a:xfrm>
-        </p:spPr>
-        <p:txBody>
-          <a:bodyPr>
-            <a:normAutofit/>
-          </a:bodyPr>
-          <a:lstStyle/>
-          <a:p>
-            <a:pPr algn="ctr"/>
-            <a:r>
-              <a:rPr lang="pl-PL" sz="8000" dirty="0">
-                <a:latin typeface="Freestyle Script" panose="030804020302050B0404" pitchFamily="66" charset="0"/>
-              </a:rPr>
-              <a:t>PROJECT OVERVIEW</a:t>
-            </a:r>
-          </a:p>
-        </p:txBody>
-      </p:sp>
-    </p:spTree>
-    <p:extLst>
-      <p:ext uri="{BB962C8B-B14F-4D97-AF65-F5344CB8AC3E}">
-        <p14:creationId xmlns:p14="http://schemas.microsoft.com/office/powerpoint/2010/main" val="3526989333"/>
-      </p:ext>
-    </p:extLst>
-  </p:cSld>
-  <p:clrMapOvr>
-    <a:masterClrMapping/>
-  </p:clrMapOvr>
-</p:sld>
-</file>
-
-<file path=ppt/slides/slide4.xml><?xml version="1.0" encoding="utf-8"?>
-<p:sld xmlns:a="http://schemas.openxmlformats.org/drawingml/2006/main" xmlns:r="http://schemas.openxmlformats.org/officeDocument/2006/relationships" xmlns:p="http://schemas.openxmlformats.org/presentationml/2006/main">
-  <p:cSld>
     <p:bg>
       <p:bgPr>
-        <a:blipFill dpi="0" rotWithShape="1">
-          <a:blip r:embed="rId2">
-            <a:alphaModFix amt="12000"/>
-            <a:lum/>
-          </a:blip>
-          <a:srcRect/>
-          <a:stretch>
-            <a:fillRect t="-17000" b="-17000"/>
-          </a:stretch>
-        </a:blipFill>
+        <a:gradFill flip="none" rotWithShape="1">
+          <a:gsLst>
+            <a:gs pos="0">
+              <a:schemeClr val="accent3">
+                <a:lumMod val="0"/>
+                <a:lumOff val="100000"/>
+              </a:schemeClr>
+            </a:gs>
+            <a:gs pos="35000">
+              <a:schemeClr val="accent3">
+                <a:lumMod val="0"/>
+                <a:lumOff val="100000"/>
+              </a:schemeClr>
+            </a:gs>
+            <a:gs pos="100000">
+              <a:schemeClr val="accent3">
+                <a:lumMod val="100000"/>
+              </a:schemeClr>
+            </a:gs>
+          </a:gsLst>
+          <a:path path="circle">
+            <a:fillToRect l="50000" t="-80000" r="50000" b="180000"/>
+          </a:path>
+          <a:tileRect/>
+        </a:gradFill>
         <a:effectLst/>
       </p:bgPr>
     </p:bg>
@@ -17668,7 +19366,7 @@
         </p:nvSpPr>
         <p:spPr>
           <a:xfrm>
-            <a:off x="1261872" y="385638"/>
+            <a:off x="1384211" y="0"/>
             <a:ext cx="8595360" cy="1325562"/>
           </a:xfrm>
         </p:spPr>
@@ -17681,18 +19379,30 @@
             <a:pPr algn="ctr"/>
             <a:r>
               <a:rPr lang="pl-PL" sz="8000" dirty="0">
-                <a:latin typeface="Freestyle Script" panose="030804020302050B0404" pitchFamily="66" charset="0"/>
+                <a:latin typeface="Impact" panose="020B0806030902050204" pitchFamily="34" charset="0"/>
               </a:rPr>
               <a:t> </a:t>
             </a:r>
             <a:r>
+              <a:rPr lang="pl-PL" sz="4800" dirty="0">
+                <a:latin typeface="Impact" panose="020B0806030902050204" pitchFamily="34" charset="0"/>
+              </a:rPr>
+              <a:t>PRODUCT</a:t>
+            </a:r>
+            <a:r>
               <a:rPr lang="pl-PL" sz="5400" dirty="0">
-                <a:latin typeface="Freestyle Script" panose="030804020302050B0404" pitchFamily="66" charset="0"/>
+                <a:latin typeface="Impact" panose="020B0806030902050204" pitchFamily="34" charset="0"/>
               </a:rPr>
-              <a:t>PRODUCT BRIEF</a:t>
+              <a:t> </a:t>
+            </a:r>
+            <a:r>
+              <a:rPr lang="pl-PL" sz="4800" dirty="0">
+                <a:latin typeface="Impact" panose="020B0806030902050204" pitchFamily="34" charset="0"/>
+              </a:rPr>
+              <a:t>BRIEF</a:t>
             </a:r>
             <a:endParaRPr lang="pl-PL" sz="8000" dirty="0">
-              <a:latin typeface="Freestyle Script" panose="030804020302050B0404" pitchFamily="66" charset="0"/>
+              <a:latin typeface="Impact" panose="020B0806030902050204" pitchFamily="34" charset="0"/>
             </a:endParaRPr>
           </a:p>
         </p:txBody>
@@ -17715,8 +19425,205 @@
         </p:nvSpPr>
         <p:spPr>
           <a:xfrm>
-            <a:off x="934278" y="1991815"/>
-            <a:ext cx="9352723" cy="3842453"/>
+            <a:off x="815524" y="1325562"/>
+            <a:ext cx="10180722" cy="4958007"/>
+          </a:xfrm>
+        </p:spPr>
+        <p:txBody>
+          <a:bodyPr>
+            <a:normAutofit fontScale="92500"/>
+          </a:bodyPr>
+          <a:lstStyle/>
+          <a:p>
+            <a:pPr marL="0" indent="0" algn="just">
+              <a:buNone/>
+            </a:pPr>
+            <a:r>
+              <a:rPr lang="en-GB" sz="2400" u="sng" dirty="0">
+                <a:latin typeface="Times New Roman" panose="02020603050405020304" pitchFamily="18" charset="0"/>
+                <a:cs typeface="Times New Roman" panose="02020603050405020304" pitchFamily="18" charset="0"/>
+              </a:rPr>
+              <a:t>The Client</a:t>
+            </a:r>
+          </a:p>
+          <a:p>
+            <a:pPr algn="just"/>
+            <a:r>
+              <a:rPr lang="en-GB" sz="2400" dirty="0">
+                <a:latin typeface="Times New Roman" panose="02020603050405020304" pitchFamily="18" charset="0"/>
+                <a:cs typeface="Times New Roman" panose="02020603050405020304" pitchFamily="18" charset="0"/>
+              </a:rPr>
+              <a:t>Lynsey Shepard of Abertay Plant System to build a IoT plant monitoring system</a:t>
+            </a:r>
+          </a:p>
+          <a:p>
+            <a:pPr marL="0" indent="0" algn="just">
+              <a:buNone/>
+            </a:pPr>
+            <a:r>
+              <a:rPr lang="en-GB" sz="2400" u="sng" dirty="0">
+                <a:latin typeface="Times New Roman" panose="02020603050405020304" pitchFamily="18" charset="0"/>
+                <a:cs typeface="Times New Roman" panose="02020603050405020304" pitchFamily="18" charset="0"/>
+              </a:rPr>
+              <a:t>The Brief</a:t>
+            </a:r>
+          </a:p>
+          <a:p>
+            <a:pPr algn="just"/>
+            <a:r>
+              <a:rPr lang="en-GB" sz="2400" dirty="0">
+                <a:latin typeface="Times New Roman" panose="02020603050405020304" pitchFamily="18" charset="0"/>
+                <a:cs typeface="Times New Roman" panose="02020603050405020304" pitchFamily="18" charset="0"/>
+              </a:rPr>
+              <a:t>Task with build an inexpensive alternative to current products</a:t>
+            </a:r>
+          </a:p>
+          <a:p>
+            <a:pPr algn="just"/>
+            <a:r>
+              <a:rPr lang="en-GB" sz="2400" dirty="0">
+                <a:latin typeface="Times New Roman" panose="02020603050405020304" pitchFamily="18" charset="0"/>
+                <a:cs typeface="Times New Roman" panose="02020603050405020304" pitchFamily="18" charset="0"/>
+              </a:rPr>
+              <a:t>Collect data on the plants environment </a:t>
+            </a:r>
+          </a:p>
+          <a:p>
+            <a:pPr algn="just"/>
+            <a:r>
+              <a:rPr lang="en-GB" sz="2400" dirty="0">
+                <a:latin typeface="Times New Roman" panose="02020603050405020304" pitchFamily="18" charset="0"/>
+                <a:cs typeface="Times New Roman" panose="02020603050405020304" pitchFamily="18" charset="0"/>
+              </a:rPr>
+              <a:t>Provide a graphical representation of the data collected.</a:t>
+            </a:r>
+          </a:p>
+          <a:p>
+            <a:pPr marL="0" indent="0" algn="just">
+              <a:buNone/>
+            </a:pPr>
+            <a:r>
+              <a:rPr lang="en-GB" sz="2400" u="sng" dirty="0">
+                <a:latin typeface="Times New Roman" panose="02020603050405020304" pitchFamily="18" charset="0"/>
+                <a:cs typeface="Times New Roman" panose="02020603050405020304" pitchFamily="18" charset="0"/>
+              </a:rPr>
+              <a:t>What will be covered?</a:t>
+            </a:r>
+          </a:p>
+          <a:p>
+            <a:pPr algn="just"/>
+            <a:r>
+              <a:rPr lang="en-GB" sz="2400" dirty="0">
+                <a:latin typeface="Times New Roman" panose="02020603050405020304" pitchFamily="18" charset="0"/>
+                <a:cs typeface="Times New Roman" panose="02020603050405020304" pitchFamily="18" charset="0"/>
+              </a:rPr>
+              <a:t>Our proposal on how we are going to build a </a:t>
+            </a:r>
+            <a:r>
+              <a:rPr lang="pl-PL" sz="2400" dirty="0">
+                <a:latin typeface="Times New Roman" panose="02020603050405020304" pitchFamily="18" charset="0"/>
+                <a:cs typeface="Times New Roman" panose="02020603050405020304" pitchFamily="18" charset="0"/>
+              </a:rPr>
+              <a:t>smart plant </a:t>
+            </a:r>
+            <a:r>
+              <a:rPr lang="pl-PL" sz="2400" u="sng" dirty="0">
+                <a:latin typeface="Times New Roman" panose="02020603050405020304" pitchFamily="18" charset="0"/>
+                <a:cs typeface="Times New Roman" panose="02020603050405020304" pitchFamily="18" charset="0"/>
+              </a:rPr>
+              <a:t>Monitoring System</a:t>
+            </a:r>
+            <a:r>
+              <a:rPr lang="en-GB" sz="2400" dirty="0">
+                <a:latin typeface="Times New Roman" panose="02020603050405020304" pitchFamily="18" charset="0"/>
+                <a:cs typeface="Times New Roman" panose="02020603050405020304" pitchFamily="18" charset="0"/>
+              </a:rPr>
+              <a:t> for your company</a:t>
+            </a:r>
+          </a:p>
+          <a:p>
+            <a:pPr algn="just"/>
+            <a:r>
+              <a:rPr lang="en-GB" sz="2400" dirty="0">
+                <a:latin typeface="Times New Roman" panose="02020603050405020304" pitchFamily="18" charset="0"/>
+                <a:cs typeface="Times New Roman" panose="02020603050405020304" pitchFamily="18" charset="0"/>
+              </a:rPr>
+              <a:t>Our ideas about what is needed to accomplish this project and how we will go about it</a:t>
+            </a:r>
+          </a:p>
+          <a:p>
+            <a:pPr algn="just"/>
+            <a:endParaRPr lang="en-GB" sz="2400" dirty="0">
+              <a:latin typeface="Times New Roman" panose="02020603050405020304" pitchFamily="18" charset="0"/>
+              <a:cs typeface="Times New Roman" panose="02020603050405020304" pitchFamily="18" charset="0"/>
+            </a:endParaRPr>
+          </a:p>
+          <a:p>
+            <a:pPr algn="just"/>
+            <a:endParaRPr lang="en-GB" sz="2400" dirty="0">
+              <a:latin typeface="Times New Roman" panose="02020603050405020304" pitchFamily="18" charset="0"/>
+              <a:cs typeface="Times New Roman" panose="02020603050405020304" pitchFamily="18" charset="0"/>
+            </a:endParaRPr>
+          </a:p>
+          <a:p>
+            <a:pPr algn="just"/>
+            <a:endParaRPr lang="en-GB" sz="2400" dirty="0">
+              <a:latin typeface="Times New Roman" panose="02020603050405020304" pitchFamily="18" charset="0"/>
+              <a:cs typeface="Times New Roman" panose="02020603050405020304" pitchFamily="18" charset="0"/>
+            </a:endParaRPr>
+          </a:p>
+        </p:txBody>
+      </p:sp>
+    </p:spTree>
+    <p:extLst>
+      <p:ext uri="{BB962C8B-B14F-4D97-AF65-F5344CB8AC3E}">
+        <p14:creationId xmlns:p14="http://schemas.microsoft.com/office/powerpoint/2010/main" val="3093978134"/>
+      </p:ext>
+    </p:extLst>
+  </p:cSld>
+  <p:clrMapOvr>
+    <a:masterClrMapping/>
+  </p:clrMapOvr>
+</p:sld>
+</file>
+
+<file path=ppt/slides/slide4.xml><?xml version="1.0" encoding="utf-8"?>
+<p:sld xmlns:a="http://schemas.openxmlformats.org/drawingml/2006/main" xmlns:r="http://schemas.openxmlformats.org/officeDocument/2006/relationships" xmlns:p="http://schemas.openxmlformats.org/presentationml/2006/main">
+  <p:cSld>
+    <p:spTree>
+      <p:nvGrpSpPr>
+        <p:cNvPr id="1" name=""/>
+        <p:cNvGrpSpPr/>
+        <p:nvPr/>
+      </p:nvGrpSpPr>
+      <p:grpSpPr>
+        <a:xfrm>
+          <a:off x="0" y="0"/>
+          <a:ext cx="0" cy="0"/>
+          <a:chOff x="0" y="0"/>
+          <a:chExt cx="0" cy="0"/>
+        </a:xfrm>
+      </p:grpSpPr>
+      <p:sp>
+        <p:nvSpPr>
+          <p:cNvPr id="2" name="Tytuł 1">
+            <a:extLst>
+              <a:ext uri="{FF2B5EF4-FFF2-40B4-BE49-F238E27FC236}">
+                <a16:creationId xmlns:a16="http://schemas.microsoft.com/office/drawing/2014/main" id="{0FA35352-C52F-4ED4-A748-574B245CC6C5}"/>
+              </a:ext>
+            </a:extLst>
+          </p:cNvPr>
+          <p:cNvSpPr>
+            <a:spLocks noGrp="1"/>
+          </p:cNvSpPr>
+          <p:nvPr>
+            <p:ph type="title"/>
+          </p:nvPr>
+        </p:nvSpPr>
+        <p:spPr>
+          <a:xfrm>
+            <a:off x="2751814" y="2409802"/>
+            <a:ext cx="6688371" cy="1492132"/>
           </a:xfrm>
         </p:spPr>
         <p:txBody>
@@ -17725,103 +19632,31 @@
           </a:bodyPr>
           <a:lstStyle/>
           <a:p>
-            <a:pPr>
-              <a:lnSpc>
-                <a:spcPct val="160000"/>
-              </a:lnSpc>
-            </a:pPr>
-            <a:r>
-              <a:rPr lang="pl-PL" sz="2400" dirty="0">
-                <a:latin typeface="Carlito" panose="020F0502020204030204" pitchFamily="34" charset="0"/>
-                <a:cs typeface="Carlito" panose="020F0502020204030204" pitchFamily="34" charset="0"/>
+            <a:pPr algn="ctr"/>
+            <a:r>
+              <a:rPr lang="en-GB" sz="8000" dirty="0">
+                <a:solidFill>
+                  <a:schemeClr val="tx1"/>
+                </a:solidFill>
+                <a:latin typeface="Impact" panose="020B0806030902050204" pitchFamily="34" charset="0"/>
+                <a:cs typeface="Times New Roman" panose="02020603050405020304" pitchFamily="18" charset="0"/>
               </a:rPr>
-              <a:t>Develop an affordable smart plant </a:t>
-            </a:r>
-            <a:r>
-              <a:rPr lang="pl-PL" sz="2400" dirty="0">
-                <a:solidFill>
-                  <a:srgbClr val="00B050"/>
-                </a:solidFill>
-                <a:latin typeface="Carlito" panose="020F0502020204030204" pitchFamily="34" charset="0"/>
-                <a:cs typeface="Carlito" panose="020F0502020204030204" pitchFamily="34" charset="0"/>
-              </a:rPr>
-              <a:t>Monitoring &amp; Maintenance System</a:t>
-            </a:r>
-          </a:p>
-          <a:p>
-            <a:pPr>
-              <a:lnSpc>
-                <a:spcPct val="160000"/>
-              </a:lnSpc>
-            </a:pPr>
-            <a:r>
-              <a:rPr lang="pl-PL" sz="2400" dirty="0">
-                <a:latin typeface="Carlito" panose="020F0502020204030204" pitchFamily="34" charset="0"/>
-                <a:cs typeface="Carlito" panose="020F0502020204030204" pitchFamily="34" charset="0"/>
-              </a:rPr>
-              <a:t>Improve gardening skills with the application providing</a:t>
-            </a:r>
-          </a:p>
-          <a:p>
-            <a:pPr marL="0" indent="0">
-              <a:lnSpc>
-                <a:spcPct val="160000"/>
-              </a:lnSpc>
-              <a:buNone/>
-            </a:pPr>
-            <a:r>
-              <a:rPr lang="pl-PL" sz="2400" dirty="0">
-                <a:latin typeface="Carlito" panose="020F0502020204030204" pitchFamily="34" charset="0"/>
-                <a:cs typeface="Carlito" panose="020F0502020204030204" pitchFamily="34" charset="0"/>
-              </a:rPr>
-              <a:t> precise data regarding the plant growth.</a:t>
-            </a:r>
-          </a:p>
-          <a:p>
-            <a:pPr>
-              <a:lnSpc>
-                <a:spcPct val="160000"/>
-              </a:lnSpc>
-            </a:pPr>
-            <a:r>
-              <a:rPr lang="pl-PL" sz="2400" dirty="0">
-                <a:latin typeface="Carlito" panose="020F0502020204030204" pitchFamily="34" charset="0"/>
-                <a:cs typeface="Carlito" panose="020F0502020204030204" pitchFamily="34" charset="0"/>
-              </a:rPr>
-              <a:t>Optimise plant growth using detailed statistics </a:t>
-            </a:r>
-          </a:p>
-          <a:p>
-            <a:pPr marL="0" indent="0">
-              <a:lnSpc>
-                <a:spcPct val="160000"/>
-              </a:lnSpc>
-              <a:buNone/>
-            </a:pPr>
-            <a:r>
-              <a:rPr lang="pl-PL" sz="2400" dirty="0">
-                <a:latin typeface="Carlito" panose="020F0502020204030204" pitchFamily="34" charset="0"/>
-                <a:cs typeface="Carlito" panose="020F0502020204030204" pitchFamily="34" charset="0"/>
-              </a:rPr>
-              <a:t>collected through </a:t>
-            </a:r>
-            <a:r>
-              <a:rPr lang="pl-PL" sz="2400" dirty="0">
-                <a:solidFill>
-                  <a:srgbClr val="00B050"/>
-                </a:solidFill>
-                <a:latin typeface="Carlito" panose="020F0502020204030204" pitchFamily="34" charset="0"/>
-                <a:cs typeface="Carlito" panose="020F0502020204030204" pitchFamily="34" charset="0"/>
-              </a:rPr>
-              <a:t>cutting-edge technology</a:t>
-            </a:r>
+              <a:t>TENTATIVE PLAN</a:t>
+            </a:r>
+            <a:endParaRPr lang="pl-PL" sz="8000" dirty="0">
+              <a:solidFill>
+                <a:schemeClr val="tx1"/>
+              </a:solidFill>
+              <a:latin typeface="Impact" panose="020B0806030902050204" pitchFamily="34" charset="0"/>
+              <a:cs typeface="Times New Roman" panose="02020603050405020304" pitchFamily="18" charset="0"/>
+            </a:endParaRPr>
           </a:p>
         </p:txBody>
       </p:sp>
     </p:spTree>
     <p:extLst>
       <p:ext uri="{BB962C8B-B14F-4D97-AF65-F5344CB8AC3E}">
-        <p14:creationId xmlns:p14="http://schemas.microsoft.com/office/powerpoint/2010/main" val="3093978134"/>
+        <p14:creationId xmlns:p14="http://schemas.microsoft.com/office/powerpoint/2010/main" val="3526989333"/>
       </p:ext>
     </p:extLst>
   </p:cSld>
@@ -17836,16 +19671,31 @@
   <p:cSld>
     <p:bg>
       <p:bgPr>
-        <a:blipFill dpi="0" rotWithShape="1">
-          <a:blip r:embed="rId2">
-            <a:alphaModFix amt="16000"/>
-            <a:lum/>
-          </a:blip>
-          <a:srcRect/>
-          <a:stretch>
-            <a:fillRect t="-9000" b="-9000"/>
-          </a:stretch>
-        </a:blipFill>
+        <a:gradFill flip="none" rotWithShape="1">
+          <a:gsLst>
+            <a:gs pos="0">
+              <a:schemeClr val="accent3">
+                <a:lumMod val="0"/>
+                <a:lumOff val="100000"/>
+              </a:schemeClr>
+            </a:gs>
+            <a:gs pos="35000">
+              <a:schemeClr val="accent3">
+                <a:lumMod val="0"/>
+                <a:lumOff val="100000"/>
+              </a:schemeClr>
+            </a:gs>
+            <a:gs pos="100000">
+              <a:schemeClr val="accent3">
+                <a:lumMod val="100000"/>
+              </a:schemeClr>
+            </a:gs>
+          </a:gsLst>
+          <a:path path="circle">
+            <a:fillToRect l="50000" t="-80000" r="50000" b="180000"/>
+          </a:path>
+          <a:tileRect/>
+        </a:gradFill>
         <a:effectLst/>
       </p:bgPr>
     </p:bg>
@@ -17868,7 +19718,7 @@
           <p:cNvPr id="2" name="Tytuł 1">
             <a:extLst>
               <a:ext uri="{FF2B5EF4-FFF2-40B4-BE49-F238E27FC236}">
-                <a16:creationId xmlns:a16="http://schemas.microsoft.com/office/drawing/2014/main" id="{7647B742-C9E2-4634-94FE-4E12CFD24A76}"/>
+                <a16:creationId xmlns:a16="http://schemas.microsoft.com/office/drawing/2014/main" id="{9C072613-9DB4-4BA4-996A-DCC73A6F36BF}"/>
               </a:ext>
             </a:extLst>
           </p:cNvPr>
@@ -17881,7 +19731,7 @@
         </p:nvSpPr>
         <p:spPr>
           <a:xfrm>
-            <a:off x="713232" y="306125"/>
+            <a:off x="834361" y="152004"/>
             <a:ext cx="9692640" cy="1325562"/>
           </a:xfrm>
         </p:spPr>
@@ -17893,20 +19743,23 @@
           <a:p>
             <a:pPr algn="ctr"/>
             <a:r>
-              <a:rPr lang="pl-PL" sz="5400" dirty="0">
-                <a:latin typeface="Freestyle Script" panose="030804020302050B0404" pitchFamily="66" charset="0"/>
+              <a:rPr lang="en-GB" sz="6000" dirty="0">
+                <a:latin typeface="Impact" panose="020B0806030902050204" pitchFamily="34" charset="0"/>
               </a:rPr>
-              <a:t>MAIN POINTS TO CONSIDER</a:t>
-            </a:r>
-          </a:p>
-        </p:txBody>
-      </p:sp>
-      <p:sp>
-        <p:nvSpPr>
-          <p:cNvPr id="3" name="Symbol zastępczy zawartości 2">
+              <a:t>Clients Requirements</a:t>
+            </a:r>
+            <a:endParaRPr lang="pl-PL" sz="6000" dirty="0">
+              <a:latin typeface="Impact" panose="020B0806030902050204" pitchFamily="34" charset="0"/>
+            </a:endParaRPr>
+          </a:p>
+        </p:txBody>
+      </p:sp>
+      <p:sp>
+        <p:nvSpPr>
+          <p:cNvPr id="4" name="Symbol zastępczy zawartości 2">
             <a:extLst>
               <a:ext uri="{FF2B5EF4-FFF2-40B4-BE49-F238E27FC236}">
-                <a16:creationId xmlns:a16="http://schemas.microsoft.com/office/drawing/2014/main" id="{25A00203-4B8E-4C44-9273-412B98949066}"/>
+                <a16:creationId xmlns:a16="http://schemas.microsoft.com/office/drawing/2014/main" id="{60D41FE0-5035-4C08-8F3E-72067F6655A5}"/>
               </a:ext>
             </a:extLst>
           </p:cNvPr>
@@ -17919,234 +19772,140 @@
         </p:nvSpPr>
         <p:spPr>
           <a:xfrm>
-            <a:off x="1440002" y="1816924"/>
-            <a:ext cx="8595360" cy="4351337"/>
+            <a:off x="834361" y="1477566"/>
+            <a:ext cx="9352723" cy="4604709"/>
           </a:xfrm>
         </p:spPr>
         <p:txBody>
-          <a:bodyPr/>
-          <a:lstStyle/>
-          <a:p>
-            <a:endParaRPr lang="pl-PL" dirty="0"/>
-          </a:p>
-          <a:p>
-            <a:pPr marL="0" indent="0">
-              <a:buNone/>
-            </a:pPr>
-            <a:endParaRPr lang="pl-PL" dirty="0"/>
-          </a:p>
-          <a:p>
-            <a:pPr marL="0" indent="0">
-              <a:buNone/>
-            </a:pPr>
-            <a:endParaRPr lang="pl-PL" dirty="0"/>
-          </a:p>
-        </p:txBody>
-      </p:sp>
-      <p:sp>
-        <p:nvSpPr>
-          <p:cNvPr id="4" name="Prostokąt 3">
-            <a:extLst>
-              <a:ext uri="{FF2B5EF4-FFF2-40B4-BE49-F238E27FC236}">
-                <a16:creationId xmlns:a16="http://schemas.microsoft.com/office/drawing/2014/main" id="{C69C9B83-2210-44A8-B190-3B667001C592}"/>
-              </a:ext>
-            </a:extLst>
-          </p:cNvPr>
-          <p:cNvSpPr/>
-          <p:nvPr/>
-        </p:nvSpPr>
-        <p:spPr>
-          <a:xfrm>
-            <a:off x="2511552" y="1823671"/>
-            <a:ext cx="6096000" cy="4384983"/>
-          </a:xfrm>
-          <a:prstGeom prst="rect">
-            <a:avLst/>
-          </a:prstGeom>
-        </p:spPr>
-        <p:txBody>
           <a:bodyPr>
-            <a:spAutoFit/>
+            <a:normAutofit/>
           </a:bodyPr>
           <a:lstStyle/>
           <a:p>
-            <a:pPr lvl="0" algn="ctr" defTabSz="914400">
-              <a:lnSpc>
-                <a:spcPct val="150000"/>
-              </a:lnSpc>
-              <a:spcBef>
-                <a:spcPts val="1400"/>
-              </a:spcBef>
-              <a:spcAft>
-                <a:spcPts val="200"/>
-              </a:spcAft>
-              <a:buClr>
-                <a:srgbClr val="6F6F74"/>
-              </a:buClr>
-              <a:buSzPct val="80000"/>
+            <a:pPr marL="0" indent="0" algn="just">
+              <a:buNone/>
             </a:pPr>
             <a:r>
-              <a:rPr lang="pl-PL" sz="2400" spc="10" dirty="0">
-                <a:solidFill>
-                  <a:srgbClr val="000000"/>
-                </a:solidFill>
-                <a:latin typeface="Carlito" panose="020F0502020204030204" pitchFamily="34" charset="0"/>
-                <a:cs typeface="Carlito" panose="020F0502020204030204" pitchFamily="34" charset="0"/>
-              </a:rPr>
-              <a:t>Hardware need</a:t>
-            </a:r>
-            <a:r>
-              <a:rPr lang="en-GB" sz="2400" spc="10" dirty="0">
-                <a:solidFill>
-                  <a:srgbClr val="000000"/>
-                </a:solidFill>
-                <a:latin typeface="Carlito" panose="020F0502020204030204" pitchFamily="34" charset="0"/>
-                <a:cs typeface="Carlito" panose="020F0502020204030204" pitchFamily="34" charset="0"/>
-              </a:rPr>
-              <a:t>ed </a:t>
-            </a:r>
-          </a:p>
-          <a:p>
-            <a:pPr lvl="0" algn="ctr" defTabSz="914400">
-              <a:lnSpc>
-                <a:spcPct val="150000"/>
-              </a:lnSpc>
-              <a:spcBef>
-                <a:spcPts val="1400"/>
-              </a:spcBef>
-              <a:spcAft>
-                <a:spcPts val="200"/>
-              </a:spcAft>
-              <a:buClr>
-                <a:srgbClr val="6F6F74"/>
-              </a:buClr>
-              <a:buSzPct val="80000"/>
+              <a:rPr lang="en-GB" sz="2000" dirty="0"/>
+              <a:t>As part of this project the client requested specific components that had to be Created.</a:t>
+            </a:r>
+          </a:p>
+          <a:p>
+            <a:pPr marL="0" indent="0">
+              <a:buNone/>
             </a:pPr>
             <a:r>
-              <a:rPr lang="en-GB" sz="2400" spc="10" dirty="0">
-                <a:solidFill>
-                  <a:srgbClr val="000000"/>
-                </a:solidFill>
-                <a:latin typeface="Carlito" panose="020F0502020204030204" pitchFamily="34" charset="0"/>
-                <a:cs typeface="Carlito" panose="020F0502020204030204" pitchFamily="34" charset="0"/>
-              </a:rPr>
-              <a:t>Software needed</a:t>
-            </a:r>
-          </a:p>
-          <a:p>
-            <a:pPr lvl="0" algn="ctr" defTabSz="914400">
-              <a:lnSpc>
-                <a:spcPct val="150000"/>
-              </a:lnSpc>
-              <a:spcBef>
-                <a:spcPts val="1400"/>
-              </a:spcBef>
-              <a:spcAft>
-                <a:spcPts val="200"/>
-              </a:spcAft>
-              <a:buClr>
-                <a:srgbClr val="6F6F74"/>
-              </a:buClr>
-              <a:buSzPct val="80000"/>
+              <a:rPr lang="en-GB" sz="2000" dirty="0"/>
+              <a:t> </a:t>
+            </a:r>
+            <a:r>
+              <a:rPr lang="en-GB" dirty="0"/>
+              <a:t>Gather sensor data on a plant: </a:t>
+            </a:r>
+          </a:p>
+          <a:p>
+            <a:pPr lvl="1" algn="just"/>
+            <a:r>
+              <a:rPr lang="en-GB" sz="1800" dirty="0"/>
+              <a:t>Temperature</a:t>
+            </a:r>
+          </a:p>
+          <a:p>
+            <a:pPr lvl="1" algn="just"/>
+            <a:r>
+              <a:rPr lang="en-GB" sz="1800" dirty="0"/>
+              <a:t>Light</a:t>
+            </a:r>
+          </a:p>
+          <a:p>
+            <a:pPr lvl="1" algn="just"/>
+            <a:r>
+              <a:rPr lang="en-GB" sz="1800" dirty="0"/>
+              <a:t>Moisture</a:t>
+            </a:r>
+          </a:p>
+          <a:p>
+            <a:pPr lvl="1" algn="just"/>
+            <a:r>
+              <a:rPr lang="en-GB" sz="1800" dirty="0"/>
+              <a:t>Humidity</a:t>
+            </a:r>
+          </a:p>
+          <a:p>
+            <a:pPr marL="274320" lvl="1" indent="0" algn="just">
+              <a:buNone/>
             </a:pPr>
             <a:r>
-              <a:rPr lang="en-GB" sz="2400" spc="10" dirty="0">
-                <a:solidFill>
-                  <a:srgbClr val="000000"/>
-                </a:solidFill>
-                <a:latin typeface="Carlito" panose="020F0502020204030204" pitchFamily="34" charset="0"/>
-                <a:cs typeface="Carlito" panose="020F0502020204030204" pitchFamily="34" charset="0"/>
-              </a:rPr>
-              <a:t>Plant needed </a:t>
-            </a:r>
-          </a:p>
-          <a:p>
-            <a:pPr lvl="0" algn="ctr" defTabSz="914400">
-              <a:lnSpc>
-                <a:spcPct val="150000"/>
-              </a:lnSpc>
-              <a:spcBef>
-                <a:spcPts val="1400"/>
-              </a:spcBef>
-              <a:spcAft>
-                <a:spcPts val="200"/>
-              </a:spcAft>
-              <a:buClr>
-                <a:srgbClr val="6F6F74"/>
-              </a:buClr>
-              <a:buSzPct val="80000"/>
+              <a:rPr lang="en-GB" sz="1800" dirty="0"/>
+              <a:t>Collect data into Database</a:t>
+            </a:r>
+          </a:p>
+          <a:p>
+            <a:pPr marL="274320" lvl="1" indent="0" algn="just">
+              <a:buNone/>
             </a:pPr>
             <a:r>
-              <a:rPr lang="en-GB" sz="2400" spc="10" dirty="0">
-                <a:solidFill>
-                  <a:srgbClr val="000000"/>
-                </a:solidFill>
-                <a:latin typeface="Carlito" panose="020F0502020204030204" pitchFamily="34" charset="0"/>
-                <a:cs typeface="Carlito" panose="020F0502020204030204" pitchFamily="34" charset="0"/>
-              </a:rPr>
-              <a:t>Time needed</a:t>
-            </a:r>
-          </a:p>
-          <a:p>
-            <a:pPr lvl="0" algn="ctr" defTabSz="914400">
-              <a:lnSpc>
-                <a:spcPct val="150000"/>
-              </a:lnSpc>
-              <a:spcBef>
-                <a:spcPts val="1400"/>
-              </a:spcBef>
-              <a:spcAft>
-                <a:spcPts val="200"/>
-              </a:spcAft>
-              <a:buClr>
-                <a:srgbClr val="6F6F74"/>
-              </a:buClr>
-              <a:buSzPct val="80000"/>
+              <a:rPr lang="en-GB" sz="1800" dirty="0"/>
+              <a:t>Present data in a graphical manner on website</a:t>
+            </a:r>
+          </a:p>
+          <a:p>
+            <a:pPr marL="274320" lvl="1" indent="0" algn="just">
+              <a:buNone/>
             </a:pPr>
             <a:r>
-              <a:rPr lang="en-GB" sz="2400" spc="10" dirty="0">
-                <a:solidFill>
-                  <a:srgbClr val="000000"/>
-                </a:solidFill>
-                <a:latin typeface="Carlito" panose="020F0502020204030204" pitchFamily="34" charset="0"/>
-                <a:cs typeface="Carlito" panose="020F0502020204030204" pitchFamily="34" charset="0"/>
-              </a:rPr>
-              <a:t>Power source</a:t>
-            </a:r>
-          </a:p>
-          <a:p>
-            <a:pPr lvl="0" algn="ctr" defTabSz="914400">
-              <a:lnSpc>
-                <a:spcPct val="150000"/>
-              </a:lnSpc>
-              <a:spcBef>
-                <a:spcPts val="1400"/>
-              </a:spcBef>
-              <a:spcAft>
-                <a:spcPts val="200"/>
-              </a:spcAft>
-              <a:buClr>
-                <a:srgbClr val="6F6F74"/>
-              </a:buClr>
-              <a:buSzPct val="80000"/>
+              <a:rPr lang="en-GB" sz="1800" dirty="0"/>
+              <a:t>Ability to produce device commercially</a:t>
+            </a:r>
+          </a:p>
+          <a:p>
+            <a:pPr marL="274320" lvl="1" indent="0" algn="just">
+              <a:buNone/>
             </a:pPr>
             <a:r>
-              <a:rPr lang="en-GB" sz="2400" spc="10" dirty="0">
-                <a:solidFill>
-                  <a:srgbClr val="000000"/>
-                </a:solidFill>
-                <a:latin typeface="Carlito" panose="020F0502020204030204" pitchFamily="34" charset="0"/>
-                <a:cs typeface="Carlito" panose="020F0502020204030204" pitchFamily="34" charset="0"/>
-              </a:rPr>
-              <a:t>Data Storage regulations</a:t>
-            </a:r>
+              <a:rPr lang="en-GB" sz="1800" dirty="0"/>
+              <a:t>Easy set-up of device </a:t>
+            </a:r>
+          </a:p>
+          <a:p>
+            <a:pPr marL="274320" lvl="1" indent="0" algn="just">
+              <a:buNone/>
+            </a:pPr>
+            <a:endParaRPr lang="en-GB" sz="1800" dirty="0"/>
+          </a:p>
+          <a:p>
+            <a:pPr marL="274320" lvl="1" indent="0" algn="just">
+              <a:buNone/>
+            </a:pPr>
+            <a:r>
+              <a:rPr lang="en-GB" sz="1800" dirty="0"/>
+              <a:t> </a:t>
+            </a:r>
+          </a:p>
+          <a:p>
+            <a:pPr marL="274320" lvl="1" indent="0" algn="just">
+              <a:buNone/>
+            </a:pPr>
+            <a:endParaRPr lang="en-GB" sz="1800" dirty="0"/>
+          </a:p>
+          <a:p>
+            <a:pPr algn="just"/>
+            <a:endParaRPr lang="en-GB" sz="2400" dirty="0"/>
+          </a:p>
+          <a:p>
+            <a:pPr algn="just"/>
+            <a:endParaRPr lang="en-GB" sz="2400" dirty="0"/>
+          </a:p>
+          <a:p>
+            <a:pPr algn="just"/>
+            <a:endParaRPr lang="en-GB" sz="2400" dirty="0"/>
           </a:p>
         </p:txBody>
       </p:sp>
     </p:spTree>
     <p:extLst>
       <p:ext uri="{BB962C8B-B14F-4D97-AF65-F5344CB8AC3E}">
-        <p14:creationId xmlns:p14="http://schemas.microsoft.com/office/powerpoint/2010/main" val="1946838235"/>
+        <p14:creationId xmlns:p14="http://schemas.microsoft.com/office/powerpoint/2010/main" val="3882246900"/>
       </p:ext>
     </p:extLst>
   </p:cSld>
@@ -18161,16 +19920,31 @@
   <p:cSld>
     <p:bg>
       <p:bgPr>
-        <a:blipFill dpi="0" rotWithShape="1">
-          <a:blip r:embed="rId2">
-            <a:alphaModFix amt="22000"/>
-            <a:lum/>
-          </a:blip>
-          <a:srcRect/>
-          <a:stretch>
-            <a:fillRect t="-9000" b="-9000"/>
-          </a:stretch>
-        </a:blipFill>
+        <a:gradFill flip="none" rotWithShape="1">
+          <a:gsLst>
+            <a:gs pos="0">
+              <a:schemeClr val="accent3">
+                <a:lumMod val="0"/>
+                <a:lumOff val="100000"/>
+              </a:schemeClr>
+            </a:gs>
+            <a:gs pos="35000">
+              <a:schemeClr val="accent3">
+                <a:lumMod val="0"/>
+                <a:lumOff val="100000"/>
+              </a:schemeClr>
+            </a:gs>
+            <a:gs pos="100000">
+              <a:schemeClr val="accent3">
+                <a:lumMod val="100000"/>
+              </a:schemeClr>
+            </a:gs>
+          </a:gsLst>
+          <a:path path="circle">
+            <a:fillToRect l="50000" t="-80000" r="50000" b="180000"/>
+          </a:path>
+          <a:tileRect/>
+        </a:gradFill>
         <a:effectLst/>
       </p:bgPr>
     </p:bg>
@@ -18218,19 +19992,732 @@
           <a:p>
             <a:pPr algn="ctr"/>
             <a:r>
-              <a:rPr lang="en-GB" sz="5400" dirty="0">
-                <a:latin typeface="Freestyle Script" panose="030804020302050B0404" pitchFamily="66" charset="0"/>
+              <a:rPr lang="en-GB" sz="6000" dirty="0">
+                <a:latin typeface="Impact" panose="020B0806030902050204" pitchFamily="34" charset="0"/>
               </a:rPr>
-              <a:t>THE CLIENT IN QUESTION</a:t>
-            </a:r>
-            <a:endParaRPr lang="pl-PL" sz="5400" b="1" dirty="0"/>
+              <a:t>Meeting Requirements</a:t>
+            </a:r>
+            <a:endParaRPr lang="pl-PL" sz="6000" dirty="0">
+              <a:latin typeface="Impact" panose="020B0806030902050204" pitchFamily="34" charset="0"/>
+            </a:endParaRPr>
+          </a:p>
+        </p:txBody>
+      </p:sp>
+      <p:sp>
+        <p:nvSpPr>
+          <p:cNvPr id="4" name="Symbol zastępczy zawartości 2">
+            <a:extLst>
+              <a:ext uri="{FF2B5EF4-FFF2-40B4-BE49-F238E27FC236}">
+                <a16:creationId xmlns:a16="http://schemas.microsoft.com/office/drawing/2014/main" id="{60D41FE0-5035-4C08-8F3E-72067F6655A5}"/>
+              </a:ext>
+            </a:extLst>
+          </p:cNvPr>
+          <p:cNvSpPr>
+            <a:spLocks noGrp="1"/>
+          </p:cNvSpPr>
+          <p:nvPr>
+            <p:ph idx="1"/>
+          </p:nvPr>
+        </p:nvSpPr>
+        <p:spPr>
+          <a:xfrm>
+            <a:off x="492369" y="1477566"/>
+            <a:ext cx="10269417" cy="4604709"/>
+          </a:xfrm>
+        </p:spPr>
+        <p:txBody>
+          <a:bodyPr>
+            <a:normAutofit fontScale="62500" lnSpcReduction="20000"/>
+          </a:bodyPr>
+          <a:lstStyle/>
+          <a:p>
+            <a:pPr marL="0" indent="0" algn="just">
+              <a:buNone/>
+            </a:pPr>
+            <a:r>
+              <a:rPr lang="en-GB" sz="3200" dirty="0"/>
+              <a:t>In order to satisfy the needs the client has laid out the following will be done:</a:t>
+            </a:r>
+          </a:p>
+          <a:p>
+            <a:pPr algn="just"/>
+            <a:r>
+              <a:rPr lang="en-GB" sz="3200" dirty="0"/>
+              <a:t>Use an Arduino UNO paired with a WEMOS board to collect data through proprietary sensors</a:t>
+            </a:r>
+          </a:p>
+          <a:p>
+            <a:pPr algn="just"/>
+            <a:r>
+              <a:rPr lang="en-GB" sz="3200" dirty="0"/>
+              <a:t>Push the data collected from the boards to a database</a:t>
+            </a:r>
+          </a:p>
+          <a:p>
+            <a:pPr algn="just"/>
+            <a:r>
+              <a:rPr lang="en-GB" sz="3200" dirty="0"/>
+              <a:t>Create a web portal that dynamically graphs data</a:t>
+            </a:r>
+          </a:p>
+          <a:p>
+            <a:pPr algn="just"/>
+            <a:r>
+              <a:rPr lang="en-GB" sz="3200" dirty="0"/>
+              <a:t>Devices will be very easy to manufacture </a:t>
+            </a:r>
+            <a:r>
+              <a:rPr lang="en-GB" sz="3200" dirty="0" err="1"/>
+              <a:t>en</a:t>
+            </a:r>
+            <a:r>
+              <a:rPr lang="en-GB" sz="3200" dirty="0"/>
+              <a:t>-masse</a:t>
+            </a:r>
+          </a:p>
+          <a:p>
+            <a:pPr algn="just"/>
+            <a:r>
+              <a:rPr lang="en-GB" sz="3200" dirty="0">
+                <a:solidFill>
+                  <a:srgbClr val="FF0000"/>
+                </a:solidFill>
+              </a:rPr>
+              <a:t>Device will be “plug and play”.</a:t>
+            </a:r>
+          </a:p>
+          <a:p>
+            <a:pPr algn="just"/>
+            <a:endParaRPr lang="en-GB" sz="2900" dirty="0"/>
+          </a:p>
+          <a:p>
+            <a:pPr algn="just"/>
+            <a:endParaRPr lang="en-GB" sz="2000" dirty="0"/>
+          </a:p>
+          <a:p>
+            <a:pPr algn="just"/>
+            <a:endParaRPr lang="en-GB" sz="2000" dirty="0"/>
+          </a:p>
+          <a:p>
+            <a:pPr marL="0" indent="0" algn="just">
+              <a:buNone/>
+            </a:pPr>
+            <a:endParaRPr lang="en-GB" sz="1800" dirty="0"/>
+          </a:p>
+          <a:p>
+            <a:pPr marL="274320" lvl="1" indent="0" algn="just">
+              <a:buNone/>
+            </a:pPr>
+            <a:endParaRPr lang="en-GB" sz="1800" dirty="0"/>
+          </a:p>
+          <a:p>
+            <a:pPr marL="274320" lvl="1" indent="0" algn="just">
+              <a:buNone/>
+            </a:pPr>
+            <a:r>
+              <a:rPr lang="en-GB" sz="1800" dirty="0"/>
+              <a:t> </a:t>
+            </a:r>
+          </a:p>
+          <a:p>
+            <a:pPr marL="274320" lvl="1" indent="0" algn="just">
+              <a:buNone/>
+            </a:pPr>
+            <a:endParaRPr lang="en-GB" sz="1800" dirty="0"/>
+          </a:p>
+          <a:p>
+            <a:pPr algn="just"/>
+            <a:endParaRPr lang="en-GB" sz="2400" dirty="0"/>
+          </a:p>
+          <a:p>
+            <a:pPr algn="just"/>
+            <a:endParaRPr lang="en-GB" sz="2400" dirty="0"/>
+          </a:p>
+          <a:p>
+            <a:pPr algn="just"/>
+            <a:endParaRPr lang="en-GB" sz="2400" dirty="0"/>
           </a:p>
         </p:txBody>
       </p:sp>
     </p:spTree>
     <p:extLst>
       <p:ext uri="{BB962C8B-B14F-4D97-AF65-F5344CB8AC3E}">
-        <p14:creationId xmlns:p14="http://schemas.microsoft.com/office/powerpoint/2010/main" val="3882246900"/>
+        <p14:creationId xmlns:p14="http://schemas.microsoft.com/office/powerpoint/2010/main" val="2124398066"/>
+      </p:ext>
+    </p:extLst>
+  </p:cSld>
+  <p:clrMapOvr>
+    <a:masterClrMapping/>
+  </p:clrMapOvr>
+</p:sld>
+</file>
+
+<file path=ppt/slides/slide7.xml><?xml version="1.0" encoding="utf-8"?>
+<p:sld xmlns:a="http://schemas.openxmlformats.org/drawingml/2006/main" xmlns:r="http://schemas.openxmlformats.org/officeDocument/2006/relationships" xmlns:p="http://schemas.openxmlformats.org/presentationml/2006/main">
+  <p:cSld>
+    <p:bg>
+      <p:bgPr>
+        <a:gradFill flip="none" rotWithShape="1">
+          <a:gsLst>
+            <a:gs pos="0">
+              <a:schemeClr val="accent3">
+                <a:lumMod val="0"/>
+                <a:lumOff val="100000"/>
+              </a:schemeClr>
+            </a:gs>
+            <a:gs pos="35000">
+              <a:schemeClr val="accent3">
+                <a:lumMod val="0"/>
+                <a:lumOff val="100000"/>
+              </a:schemeClr>
+            </a:gs>
+            <a:gs pos="100000">
+              <a:schemeClr val="accent3">
+                <a:lumMod val="100000"/>
+              </a:schemeClr>
+            </a:gs>
+          </a:gsLst>
+          <a:path path="circle">
+            <a:fillToRect l="50000" t="-80000" r="50000" b="180000"/>
+          </a:path>
+          <a:tileRect/>
+        </a:gradFill>
+        <a:effectLst/>
+      </p:bgPr>
+    </p:bg>
+    <p:spTree>
+      <p:nvGrpSpPr>
+        <p:cNvPr id="1" name=""/>
+        <p:cNvGrpSpPr/>
+        <p:nvPr/>
+      </p:nvGrpSpPr>
+      <p:grpSpPr>
+        <a:xfrm>
+          <a:off x="0" y="0"/>
+          <a:ext cx="0" cy="0"/>
+          <a:chOff x="0" y="0"/>
+          <a:chExt cx="0" cy="0"/>
+        </a:xfrm>
+      </p:grpSpPr>
+      <p:sp>
+        <p:nvSpPr>
+          <p:cNvPr id="2" name="Tytuł 1">
+            <a:extLst>
+              <a:ext uri="{FF2B5EF4-FFF2-40B4-BE49-F238E27FC236}">
+                <a16:creationId xmlns:a16="http://schemas.microsoft.com/office/drawing/2014/main" id="{9C072613-9DB4-4BA4-996A-DCC73A6F36BF}"/>
+              </a:ext>
+            </a:extLst>
+          </p:cNvPr>
+          <p:cNvSpPr>
+            <a:spLocks noGrp="1"/>
+          </p:cNvSpPr>
+          <p:nvPr>
+            <p:ph type="title"/>
+          </p:nvPr>
+        </p:nvSpPr>
+        <p:spPr>
+          <a:xfrm>
+            <a:off x="834361" y="152004"/>
+            <a:ext cx="9692640" cy="1325562"/>
+          </a:xfrm>
+        </p:spPr>
+        <p:txBody>
+          <a:bodyPr>
+            <a:normAutofit/>
+          </a:bodyPr>
+          <a:lstStyle/>
+          <a:p>
+            <a:pPr algn="ctr"/>
+            <a:r>
+              <a:rPr lang="en-GB" sz="6000" dirty="0">
+                <a:latin typeface="Impact" panose="020B0806030902050204" pitchFamily="34" charset="0"/>
+              </a:rPr>
+              <a:t>Project Approach</a:t>
+            </a:r>
+            <a:endParaRPr lang="pl-PL" sz="6000" dirty="0">
+              <a:latin typeface="Impact" panose="020B0806030902050204" pitchFamily="34" charset="0"/>
+            </a:endParaRPr>
+          </a:p>
+        </p:txBody>
+      </p:sp>
+      <p:sp>
+        <p:nvSpPr>
+          <p:cNvPr id="4" name="Symbol zastępczy zawartości 2">
+            <a:extLst>
+              <a:ext uri="{FF2B5EF4-FFF2-40B4-BE49-F238E27FC236}">
+                <a16:creationId xmlns:a16="http://schemas.microsoft.com/office/drawing/2014/main" id="{60D41FE0-5035-4C08-8F3E-72067F6655A5}"/>
+              </a:ext>
+            </a:extLst>
+          </p:cNvPr>
+          <p:cNvSpPr>
+            <a:spLocks noGrp="1"/>
+          </p:cNvSpPr>
+          <p:nvPr>
+            <p:ph idx="1"/>
+          </p:nvPr>
+        </p:nvSpPr>
+        <p:spPr>
+          <a:xfrm>
+            <a:off x="492369" y="1477566"/>
+            <a:ext cx="10269417" cy="4604709"/>
+          </a:xfrm>
+        </p:spPr>
+        <p:txBody>
+          <a:bodyPr>
+            <a:normAutofit/>
+          </a:bodyPr>
+          <a:lstStyle/>
+          <a:p>
+            <a:pPr marL="0" indent="0" algn="just">
+              <a:buNone/>
+            </a:pPr>
+            <a:r>
+              <a:rPr lang="en-GB" sz="2000" dirty="0"/>
+              <a:t>In order to complete this project the following shall be done:</a:t>
+            </a:r>
+          </a:p>
+          <a:p>
+            <a:pPr algn="just"/>
+            <a:r>
+              <a:rPr lang="en-GB" sz="2000" dirty="0"/>
+              <a:t>Create a project plan</a:t>
+            </a:r>
+          </a:p>
+          <a:p>
+            <a:pPr algn="just"/>
+            <a:r>
+              <a:rPr lang="en-GB" sz="2000" dirty="0"/>
+              <a:t>Test feasibility of desired outcome</a:t>
+            </a:r>
+          </a:p>
+          <a:p>
+            <a:pPr algn="just"/>
+            <a:r>
+              <a:rPr lang="en-GB" sz="2000" dirty="0"/>
+              <a:t>Regular consultations with client – improvements or concerns</a:t>
+            </a:r>
+          </a:p>
+          <a:p>
+            <a:pPr algn="just"/>
+            <a:r>
+              <a:rPr lang="en-GB" sz="2000" dirty="0"/>
+              <a:t>Produce necessary project documentation</a:t>
+            </a:r>
+          </a:p>
+          <a:p>
+            <a:pPr algn="just"/>
+            <a:r>
+              <a:rPr lang="en-GB" sz="2000" dirty="0"/>
+              <a:t>Develop prototype – hardware and performance testing </a:t>
+            </a:r>
+          </a:p>
+          <a:p>
+            <a:pPr algn="just"/>
+            <a:r>
+              <a:rPr lang="en-GB" sz="2000" dirty="0"/>
+              <a:t>Share notice board with the client</a:t>
+            </a:r>
+          </a:p>
+          <a:p>
+            <a:pPr marL="0" indent="0" algn="just">
+              <a:buNone/>
+            </a:pPr>
+            <a:endParaRPr lang="en-GB" dirty="0"/>
+          </a:p>
+          <a:p>
+            <a:pPr marL="274320" lvl="1" indent="0" algn="just">
+              <a:buNone/>
+            </a:pPr>
+            <a:endParaRPr lang="en-GB" sz="1800" dirty="0"/>
+          </a:p>
+          <a:p>
+            <a:pPr marL="274320" lvl="1" indent="0" algn="just">
+              <a:buNone/>
+            </a:pPr>
+            <a:r>
+              <a:rPr lang="en-GB" sz="1800" dirty="0"/>
+              <a:t> </a:t>
+            </a:r>
+          </a:p>
+          <a:p>
+            <a:pPr marL="274320" lvl="1" indent="0" algn="just">
+              <a:buNone/>
+            </a:pPr>
+            <a:endParaRPr lang="en-GB" sz="1800" dirty="0"/>
+          </a:p>
+          <a:p>
+            <a:pPr algn="just"/>
+            <a:endParaRPr lang="en-GB" sz="2400" dirty="0"/>
+          </a:p>
+          <a:p>
+            <a:pPr algn="just"/>
+            <a:endParaRPr lang="en-GB" sz="2400" dirty="0"/>
+          </a:p>
+          <a:p>
+            <a:pPr algn="just"/>
+            <a:endParaRPr lang="en-GB" sz="2400" dirty="0"/>
+          </a:p>
+        </p:txBody>
+      </p:sp>
+    </p:spTree>
+    <p:extLst>
+      <p:ext uri="{BB962C8B-B14F-4D97-AF65-F5344CB8AC3E}">
+        <p14:creationId xmlns:p14="http://schemas.microsoft.com/office/powerpoint/2010/main" val="3281862344"/>
+      </p:ext>
+    </p:extLst>
+  </p:cSld>
+  <p:clrMapOvr>
+    <a:masterClrMapping/>
+  </p:clrMapOvr>
+</p:sld>
+</file>
+
+<file path=ppt/slides/slide8.xml><?xml version="1.0" encoding="utf-8"?>
+<p:sld xmlns:a="http://schemas.openxmlformats.org/drawingml/2006/main" xmlns:r="http://schemas.openxmlformats.org/officeDocument/2006/relationships" xmlns:p="http://schemas.openxmlformats.org/presentationml/2006/main">
+  <p:cSld>
+    <p:bg>
+      <p:bgPr>
+        <a:gradFill flip="none" rotWithShape="1">
+          <a:gsLst>
+            <a:gs pos="0">
+              <a:schemeClr val="accent3">
+                <a:lumMod val="0"/>
+                <a:lumOff val="100000"/>
+              </a:schemeClr>
+            </a:gs>
+            <a:gs pos="35000">
+              <a:schemeClr val="accent3">
+                <a:lumMod val="0"/>
+                <a:lumOff val="100000"/>
+              </a:schemeClr>
+            </a:gs>
+            <a:gs pos="100000">
+              <a:schemeClr val="accent3">
+                <a:lumMod val="100000"/>
+              </a:schemeClr>
+            </a:gs>
+          </a:gsLst>
+          <a:path path="circle">
+            <a:fillToRect l="50000" t="-80000" r="50000" b="180000"/>
+          </a:path>
+          <a:tileRect/>
+        </a:gradFill>
+        <a:effectLst/>
+      </p:bgPr>
+    </p:bg>
+    <p:spTree>
+      <p:nvGrpSpPr>
+        <p:cNvPr id="1" name=""/>
+        <p:cNvGrpSpPr/>
+        <p:nvPr/>
+      </p:nvGrpSpPr>
+      <p:grpSpPr>
+        <a:xfrm>
+          <a:off x="0" y="0"/>
+          <a:ext cx="0" cy="0"/>
+          <a:chOff x="0" y="0"/>
+          <a:chExt cx="0" cy="0"/>
+        </a:xfrm>
+      </p:grpSpPr>
+      <p:sp>
+        <p:nvSpPr>
+          <p:cNvPr id="2" name="Tytuł 1">
+            <a:extLst>
+              <a:ext uri="{FF2B5EF4-FFF2-40B4-BE49-F238E27FC236}">
+                <a16:creationId xmlns:a16="http://schemas.microsoft.com/office/drawing/2014/main" id="{9C072613-9DB4-4BA4-996A-DCC73A6F36BF}"/>
+              </a:ext>
+            </a:extLst>
+          </p:cNvPr>
+          <p:cNvSpPr>
+            <a:spLocks noGrp="1"/>
+          </p:cNvSpPr>
+          <p:nvPr>
+            <p:ph type="title"/>
+          </p:nvPr>
+        </p:nvSpPr>
+        <p:spPr>
+          <a:xfrm>
+            <a:off x="834361" y="152004"/>
+            <a:ext cx="9692640" cy="1325562"/>
+          </a:xfrm>
+        </p:spPr>
+        <p:txBody>
+          <a:bodyPr>
+            <a:normAutofit/>
+          </a:bodyPr>
+          <a:lstStyle/>
+          <a:p>
+            <a:pPr algn="ctr"/>
+            <a:r>
+              <a:rPr lang="en-GB" sz="6000" dirty="0">
+                <a:latin typeface="Impact" panose="020B0806030902050204" pitchFamily="34" charset="0"/>
+              </a:rPr>
+              <a:t>Deliverables</a:t>
+            </a:r>
+            <a:endParaRPr lang="pl-PL" sz="6000" dirty="0">
+              <a:latin typeface="Impact" panose="020B0806030902050204" pitchFamily="34" charset="0"/>
+            </a:endParaRPr>
+          </a:p>
+        </p:txBody>
+      </p:sp>
+      <p:sp>
+        <p:nvSpPr>
+          <p:cNvPr id="4" name="Symbol zastępczy zawartości 2">
+            <a:extLst>
+              <a:ext uri="{FF2B5EF4-FFF2-40B4-BE49-F238E27FC236}">
+                <a16:creationId xmlns:a16="http://schemas.microsoft.com/office/drawing/2014/main" id="{60D41FE0-5035-4C08-8F3E-72067F6655A5}"/>
+              </a:ext>
+            </a:extLst>
+          </p:cNvPr>
+          <p:cNvSpPr>
+            <a:spLocks noGrp="1"/>
+          </p:cNvSpPr>
+          <p:nvPr>
+            <p:ph idx="1"/>
+          </p:nvPr>
+        </p:nvSpPr>
+        <p:spPr>
+          <a:xfrm>
+            <a:off x="492369" y="1477566"/>
+            <a:ext cx="10269417" cy="4604709"/>
+          </a:xfrm>
+        </p:spPr>
+        <p:txBody>
+          <a:bodyPr>
+            <a:normAutofit/>
+          </a:bodyPr>
+          <a:lstStyle/>
+          <a:p>
+            <a:pPr algn="just"/>
+            <a:r>
+              <a:rPr lang="en-GB" dirty="0"/>
+              <a:t>An executive summary will be delivered to the client to provide an overview of the project</a:t>
+            </a:r>
+          </a:p>
+          <a:p>
+            <a:pPr algn="just"/>
+            <a:r>
+              <a:rPr lang="en-GB" dirty="0"/>
+              <a:t>The project proposal will also be developed</a:t>
+            </a:r>
+          </a:p>
+          <a:p>
+            <a:pPr algn="just"/>
+            <a:r>
+              <a:rPr lang="en-GB" dirty="0"/>
+              <a:t>Cost breakdown</a:t>
+            </a:r>
+          </a:p>
+          <a:p>
+            <a:pPr algn="just"/>
+            <a:r>
+              <a:rPr lang="en-GB" dirty="0"/>
+              <a:t>A prototype will be showcased to the client throughout development</a:t>
+            </a:r>
+          </a:p>
+          <a:p>
+            <a:pPr algn="just"/>
+            <a:r>
+              <a:rPr lang="en-GB" dirty="0"/>
+              <a:t>Results from performance testing</a:t>
+            </a:r>
+          </a:p>
+          <a:p>
+            <a:pPr algn="just"/>
+            <a:r>
+              <a:rPr lang="en-GB" dirty="0"/>
+              <a:t>Final product will contain a device, website, and database</a:t>
+            </a:r>
+          </a:p>
+          <a:p>
+            <a:pPr algn="just"/>
+            <a:r>
+              <a:rPr lang="en-GB" dirty="0"/>
+              <a:t>User manual and other required documentation</a:t>
+            </a:r>
+          </a:p>
+        </p:txBody>
+      </p:sp>
+    </p:spTree>
+    <p:extLst>
+      <p:ext uri="{BB962C8B-B14F-4D97-AF65-F5344CB8AC3E}">
+        <p14:creationId xmlns:p14="http://schemas.microsoft.com/office/powerpoint/2010/main" val="1546114281"/>
+      </p:ext>
+    </p:extLst>
+  </p:cSld>
+  <p:clrMapOvr>
+    <a:masterClrMapping/>
+  </p:clrMapOvr>
+</p:sld>
+</file>
+
+<file path=ppt/slides/slide9.xml><?xml version="1.0" encoding="utf-8"?>
+<p:sld xmlns:a="http://schemas.openxmlformats.org/drawingml/2006/main" xmlns:r="http://schemas.openxmlformats.org/officeDocument/2006/relationships" xmlns:p="http://schemas.openxmlformats.org/presentationml/2006/main">
+  <p:cSld>
+    <p:bg>
+      <p:bgPr>
+        <a:gradFill flip="none" rotWithShape="1">
+          <a:gsLst>
+            <a:gs pos="0">
+              <a:schemeClr val="accent3">
+                <a:lumMod val="0"/>
+                <a:lumOff val="100000"/>
+              </a:schemeClr>
+            </a:gs>
+            <a:gs pos="35000">
+              <a:schemeClr val="accent3">
+                <a:lumMod val="0"/>
+                <a:lumOff val="100000"/>
+              </a:schemeClr>
+            </a:gs>
+            <a:gs pos="100000">
+              <a:schemeClr val="accent3">
+                <a:lumMod val="100000"/>
+              </a:schemeClr>
+            </a:gs>
+          </a:gsLst>
+          <a:path path="circle">
+            <a:fillToRect l="50000" t="-80000" r="50000" b="180000"/>
+          </a:path>
+          <a:tileRect/>
+        </a:gradFill>
+        <a:effectLst/>
+      </p:bgPr>
+    </p:bg>
+    <p:spTree>
+      <p:nvGrpSpPr>
+        <p:cNvPr id="1" name=""/>
+        <p:cNvGrpSpPr/>
+        <p:nvPr/>
+      </p:nvGrpSpPr>
+      <p:grpSpPr>
+        <a:xfrm>
+          <a:off x="0" y="0"/>
+          <a:ext cx="0" cy="0"/>
+          <a:chOff x="0" y="0"/>
+          <a:chExt cx="0" cy="0"/>
+        </a:xfrm>
+      </p:grpSpPr>
+      <p:sp>
+        <p:nvSpPr>
+          <p:cNvPr id="2" name="Tytuł 1">
+            <a:extLst>
+              <a:ext uri="{FF2B5EF4-FFF2-40B4-BE49-F238E27FC236}">
+                <a16:creationId xmlns:a16="http://schemas.microsoft.com/office/drawing/2014/main" id="{9C072613-9DB4-4BA4-996A-DCC73A6F36BF}"/>
+              </a:ext>
+            </a:extLst>
+          </p:cNvPr>
+          <p:cNvSpPr>
+            <a:spLocks noGrp="1"/>
+          </p:cNvSpPr>
+          <p:nvPr>
+            <p:ph type="title"/>
+          </p:nvPr>
+        </p:nvSpPr>
+        <p:spPr>
+          <a:xfrm>
+            <a:off x="834361" y="152004"/>
+            <a:ext cx="9692640" cy="1325562"/>
+          </a:xfrm>
+        </p:spPr>
+        <p:txBody>
+          <a:bodyPr>
+            <a:normAutofit/>
+          </a:bodyPr>
+          <a:lstStyle/>
+          <a:p>
+            <a:pPr algn="ctr"/>
+            <a:r>
+              <a:rPr lang="en-GB" sz="6000" dirty="0">
+                <a:latin typeface="Impact" panose="020B0806030902050204" pitchFamily="34" charset="0"/>
+              </a:rPr>
+              <a:t>Risks</a:t>
+            </a:r>
+            <a:endParaRPr lang="pl-PL" sz="6000" dirty="0">
+              <a:latin typeface="Impact" panose="020B0806030902050204" pitchFamily="34" charset="0"/>
+            </a:endParaRPr>
+          </a:p>
+        </p:txBody>
+      </p:sp>
+      <p:sp>
+        <p:nvSpPr>
+          <p:cNvPr id="4" name="Symbol zastępczy zawartości 2">
+            <a:extLst>
+              <a:ext uri="{FF2B5EF4-FFF2-40B4-BE49-F238E27FC236}">
+                <a16:creationId xmlns:a16="http://schemas.microsoft.com/office/drawing/2014/main" id="{60D41FE0-5035-4C08-8F3E-72067F6655A5}"/>
+              </a:ext>
+            </a:extLst>
+          </p:cNvPr>
+          <p:cNvSpPr>
+            <a:spLocks noGrp="1"/>
+          </p:cNvSpPr>
+          <p:nvPr>
+            <p:ph idx="1"/>
+          </p:nvPr>
+        </p:nvSpPr>
+        <p:spPr>
+          <a:xfrm>
+            <a:off x="492369" y="1477566"/>
+            <a:ext cx="10269417" cy="4604709"/>
+          </a:xfrm>
+        </p:spPr>
+        <p:txBody>
+          <a:bodyPr>
+            <a:normAutofit/>
+          </a:bodyPr>
+          <a:lstStyle/>
+          <a:p>
+            <a:pPr algn="just"/>
+            <a:r>
+              <a:rPr lang="en-GB" sz="2000" dirty="0"/>
+              <a:t>Exceeding the predetermined budget</a:t>
+            </a:r>
+          </a:p>
+          <a:p>
+            <a:pPr algn="just"/>
+            <a:r>
+              <a:rPr lang="en-GB" sz="2000" dirty="0"/>
+              <a:t>Inconsistent staff availability throughout development</a:t>
+            </a:r>
+          </a:p>
+          <a:p>
+            <a:pPr algn="just"/>
+            <a:r>
+              <a:rPr lang="en-GB" sz="2000" dirty="0"/>
+              <a:t>The technology in use becoming obsolete</a:t>
+            </a:r>
+          </a:p>
+          <a:p>
+            <a:pPr algn="just"/>
+            <a:r>
+              <a:rPr lang="en-GB" sz="2000" dirty="0"/>
+              <a:t>Data protection legislation changing (Thus not allowing us to collect said data)c</a:t>
+            </a:r>
+          </a:p>
+          <a:p>
+            <a:pPr algn="just"/>
+            <a:r>
+              <a:rPr lang="en-GB" sz="2000" dirty="0"/>
+              <a:t>Competitor creating a alternative solution</a:t>
+            </a:r>
+          </a:p>
+          <a:p>
+            <a:pPr algn="just"/>
+            <a:r>
+              <a:rPr lang="en-GB" sz="2000" dirty="0"/>
+              <a:t>Delay in delivering final product</a:t>
+            </a:r>
+          </a:p>
+          <a:p>
+            <a:pPr algn="just"/>
+            <a:endParaRPr lang="en-GB" sz="2000" dirty="0"/>
+          </a:p>
+        </p:txBody>
+      </p:sp>
+    </p:spTree>
+    <p:extLst>
+      <p:ext uri="{BB962C8B-B14F-4D97-AF65-F5344CB8AC3E}">
+        <p14:creationId xmlns:p14="http://schemas.microsoft.com/office/powerpoint/2010/main" val="70762687"/>
       </p:ext>
     </p:extLst>
   </p:cSld>
@@ -19271,4 +21758,299 @@
     </a:ext>
   </a:extLst>
 </a:theme>
+</file>
+
+<file path=ppt/theme/theme5.xml><?xml version="1.0" encoding="utf-8"?>
+<a:theme xmlns:a="http://schemas.openxmlformats.org/drawingml/2006/main" name="Office Theme">
+  <a:themeElements>
+    <a:clrScheme name="Office">
+      <a:dk1>
+        <a:sysClr val="windowText" lastClr="000000"/>
+      </a:dk1>
+      <a:lt1>
+        <a:sysClr val="window" lastClr="FFFFFF"/>
+      </a:lt1>
+      <a:dk2>
+        <a:srgbClr val="44546A"/>
+      </a:dk2>
+      <a:lt2>
+        <a:srgbClr val="E7E6E6"/>
+      </a:lt2>
+      <a:accent1>
+        <a:srgbClr val="4472C4"/>
+      </a:accent1>
+      <a:accent2>
+        <a:srgbClr val="ED7D31"/>
+      </a:accent2>
+      <a:accent3>
+        <a:srgbClr val="A5A5A5"/>
+      </a:accent3>
+      <a:accent4>
+        <a:srgbClr val="FFC000"/>
+      </a:accent4>
+      <a:accent5>
+        <a:srgbClr val="5B9BD5"/>
+      </a:accent5>
+      <a:accent6>
+        <a:srgbClr val="70AD47"/>
+      </a:accent6>
+      <a:hlink>
+        <a:srgbClr val="0563C1"/>
+      </a:hlink>
+      <a:folHlink>
+        <a:srgbClr val="954F72"/>
+      </a:folHlink>
+    </a:clrScheme>
+    <a:fontScheme name="Office">
+      <a:majorFont>
+        <a:latin typeface="Calibri Light" panose="020F0302020204030204"/>
+        <a:ea typeface=""/>
+        <a:cs typeface=""/>
+        <a:font script="Jpan" typeface="游ゴシック Light"/>
+        <a:font script="Hang" typeface="맑은 고딕"/>
+        <a:font script="Hans" typeface="等线 Light"/>
+        <a:font script="Hant" typeface="新細明體"/>
+        <a:font script="Arab" typeface="Times New Roman"/>
+        <a:font script="Hebr" typeface="Times New Roman"/>
+        <a:font script="Thai" typeface="Angsana New"/>
+        <a:font script="Ethi" typeface="Nyala"/>
+        <a:font script="Beng" typeface="Vrinda"/>
+        <a:font script="Gujr" typeface="Shruti"/>
+        <a:font script="Khmr" typeface="MoolBoran"/>
+        <a:font script="Knda" typeface="Tunga"/>
+        <a:font script="Guru" typeface="Raavi"/>
+        <a:font script="Cans" typeface="Euphemia"/>
+        <a:font script="Cher" typeface="Plantagenet Cherokee"/>
+        <a:font script="Yiii" typeface="Microsoft Yi Baiti"/>
+        <a:font script="Tibt" typeface="Microsoft Himalaya"/>
+        <a:font script="Thaa" typeface="MV Boli"/>
+        <a:font script="Deva" typeface="Mangal"/>
+        <a:font script="Telu" typeface="Gautami"/>
+        <a:font script="Taml" typeface="Latha"/>
+        <a:font script="Syrc" typeface="Estrangelo Edessa"/>
+        <a:font script="Orya" typeface="Kalinga"/>
+        <a:font script="Mlym" typeface="Kartika"/>
+        <a:font script="Laoo" typeface="DokChampa"/>
+        <a:font script="Sinh" typeface="Iskoola Pota"/>
+        <a:font script="Mong" typeface="Mongolian Baiti"/>
+        <a:font script="Viet" typeface="Times New Roman"/>
+        <a:font script="Uigh" typeface="Microsoft Uighur"/>
+        <a:font script="Geor" typeface="Sylfaen"/>
+        <a:font script="Armn" typeface="Arial"/>
+        <a:font script="Bugi" typeface="Leelawadee UI"/>
+        <a:font script="Bopo" typeface="Microsoft JhengHei"/>
+        <a:font script="Java" typeface="Javanese Text"/>
+        <a:font script="Lisu" typeface="Segoe UI"/>
+        <a:font script="Mymr" typeface="Myanmar Text"/>
+        <a:font script="Nkoo" typeface="Ebrima"/>
+        <a:font script="Olck" typeface="Nirmala UI"/>
+        <a:font script="Osma" typeface="Ebrima"/>
+        <a:font script="Phag" typeface="Phagspa"/>
+        <a:font script="Syrn" typeface="Estrangelo Edessa"/>
+        <a:font script="Syrj" typeface="Estrangelo Edessa"/>
+        <a:font script="Syre" typeface="Estrangelo Edessa"/>
+        <a:font script="Sora" typeface="Nirmala UI"/>
+        <a:font script="Tale" typeface="Microsoft Tai Le"/>
+        <a:font script="Talu" typeface="Microsoft New Tai Lue"/>
+        <a:font script="Tfng" typeface="Ebrima"/>
+      </a:majorFont>
+      <a:minorFont>
+        <a:latin typeface="Calibri" panose="020F0502020204030204"/>
+        <a:ea typeface=""/>
+        <a:cs typeface=""/>
+        <a:font script="Jpan" typeface="游ゴシック"/>
+        <a:font script="Hang" typeface="맑은 고딕"/>
+        <a:font script="Hans" typeface="等线"/>
+        <a:font script="Hant" typeface="新細明體"/>
+        <a:font script="Arab" typeface="Arial"/>
+        <a:font script="Hebr" typeface="Arial"/>
+        <a:font script="Thai" typeface="Cordia New"/>
+        <a:font script="Ethi" typeface="Nyala"/>
+        <a:font script="Beng" typeface="Vrinda"/>
+        <a:font script="Gujr" typeface="Shruti"/>
+        <a:font script="Khmr" typeface="DaunPenh"/>
+        <a:font script="Knda" typeface="Tunga"/>
+        <a:font script="Guru" typeface="Raavi"/>
+        <a:font script="Cans" typeface="Euphemia"/>
+        <a:font script="Cher" typeface="Plantagenet Cherokee"/>
+        <a:font script="Yiii" typeface="Microsoft Yi Baiti"/>
+        <a:font script="Tibt" typeface="Microsoft Himalaya"/>
+        <a:font script="Thaa" typeface="MV Boli"/>
+        <a:font script="Deva" typeface="Mangal"/>
+        <a:font script="Telu" typeface="Gautami"/>
+        <a:font script="Taml" typeface="Latha"/>
+        <a:font script="Syrc" typeface="Estrangelo Edessa"/>
+        <a:font script="Orya" typeface="Kalinga"/>
+        <a:font script="Mlym" typeface="Kartika"/>
+        <a:font script="Laoo" typeface="DokChampa"/>
+        <a:font script="Sinh" typeface="Iskoola Pota"/>
+        <a:font script="Mong" typeface="Mongolian Baiti"/>
+        <a:font script="Viet" typeface="Arial"/>
+        <a:font script="Uigh" typeface="Microsoft Uighur"/>
+        <a:font script="Geor" typeface="Sylfaen"/>
+        <a:font script="Armn" typeface="Arial"/>
+        <a:font script="Bugi" typeface="Leelawadee UI"/>
+        <a:font script="Bopo" typeface="Microsoft JhengHei"/>
+        <a:font script="Java" typeface="Javanese Text"/>
+        <a:font script="Lisu" typeface="Segoe UI"/>
+        <a:font script="Mymr" typeface="Myanmar Text"/>
+        <a:font script="Nkoo" typeface="Ebrima"/>
+        <a:font script="Olck" typeface="Nirmala UI"/>
+        <a:font script="Osma" typeface="Ebrima"/>
+        <a:font script="Phag" typeface="Phagspa"/>
+        <a:font script="Syrn" typeface="Estrangelo Edessa"/>
+        <a:font script="Syrj" typeface="Estrangelo Edessa"/>
+        <a:font script="Syre" typeface="Estrangelo Edessa"/>
+        <a:font script="Sora" typeface="Nirmala UI"/>
+        <a:font script="Tale" typeface="Microsoft Tai Le"/>
+        <a:font script="Talu" typeface="Microsoft New Tai Lue"/>
+        <a:font script="Tfng" typeface="Ebrima"/>
+      </a:minorFont>
+    </a:fontScheme>
+    <a:fmtScheme name="Office">
+      <a:fillStyleLst>
+        <a:solidFill>
+          <a:schemeClr val="phClr"/>
+        </a:solidFill>
+        <a:gradFill rotWithShape="1">
+          <a:gsLst>
+            <a:gs pos="0">
+              <a:schemeClr val="phClr">
+                <a:lumMod val="110000"/>
+                <a:satMod val="105000"/>
+                <a:tint val="67000"/>
+              </a:schemeClr>
+            </a:gs>
+            <a:gs pos="50000">
+              <a:schemeClr val="phClr">
+                <a:lumMod val="105000"/>
+                <a:satMod val="103000"/>
+                <a:tint val="73000"/>
+              </a:schemeClr>
+            </a:gs>
+            <a:gs pos="100000">
+              <a:schemeClr val="phClr">
+                <a:lumMod val="105000"/>
+                <a:satMod val="109000"/>
+                <a:tint val="81000"/>
+              </a:schemeClr>
+            </a:gs>
+          </a:gsLst>
+          <a:lin ang="5400000" scaled="0"/>
+        </a:gradFill>
+        <a:gradFill rotWithShape="1">
+          <a:gsLst>
+            <a:gs pos="0">
+              <a:schemeClr val="phClr">
+                <a:satMod val="103000"/>
+                <a:lumMod val="102000"/>
+                <a:tint val="94000"/>
+              </a:schemeClr>
+            </a:gs>
+            <a:gs pos="50000">
+              <a:schemeClr val="phClr">
+                <a:satMod val="110000"/>
+                <a:lumMod val="100000"/>
+                <a:shade val="100000"/>
+              </a:schemeClr>
+            </a:gs>
+            <a:gs pos="100000">
+              <a:schemeClr val="phClr">
+                <a:lumMod val="99000"/>
+                <a:satMod val="120000"/>
+                <a:shade val="78000"/>
+              </a:schemeClr>
+            </a:gs>
+          </a:gsLst>
+          <a:lin ang="5400000" scaled="0"/>
+        </a:gradFill>
+      </a:fillStyleLst>
+      <a:lnStyleLst>
+        <a:ln w="6350" cap="flat" cmpd="sng" algn="ctr">
+          <a:solidFill>
+            <a:schemeClr val="phClr"/>
+          </a:solidFill>
+          <a:prstDash val="solid"/>
+          <a:miter lim="800000"/>
+        </a:ln>
+        <a:ln w="12700" cap="flat" cmpd="sng" algn="ctr">
+          <a:solidFill>
+            <a:schemeClr val="phClr"/>
+          </a:solidFill>
+          <a:prstDash val="solid"/>
+          <a:miter lim="800000"/>
+        </a:ln>
+        <a:ln w="19050" cap="flat" cmpd="sng" algn="ctr">
+          <a:solidFill>
+            <a:schemeClr val="phClr"/>
+          </a:solidFill>
+          <a:prstDash val="solid"/>
+          <a:miter lim="800000"/>
+        </a:ln>
+      </a:lnStyleLst>
+      <a:effectStyleLst>
+        <a:effectStyle>
+          <a:effectLst/>
+        </a:effectStyle>
+        <a:effectStyle>
+          <a:effectLst/>
+        </a:effectStyle>
+        <a:effectStyle>
+          <a:effectLst>
+            <a:outerShdw blurRad="57150" dist="19050" dir="5400000" algn="ctr" rotWithShape="0">
+              <a:srgbClr val="000000">
+                <a:alpha val="63000"/>
+              </a:srgbClr>
+            </a:outerShdw>
+          </a:effectLst>
+        </a:effectStyle>
+      </a:effectStyleLst>
+      <a:bgFillStyleLst>
+        <a:solidFill>
+          <a:schemeClr val="phClr"/>
+        </a:solidFill>
+        <a:solidFill>
+          <a:schemeClr val="phClr">
+            <a:tint val="95000"/>
+            <a:satMod val="170000"/>
+          </a:schemeClr>
+        </a:solidFill>
+        <a:gradFill rotWithShape="1">
+          <a:gsLst>
+            <a:gs pos="0">
+              <a:schemeClr val="phClr">
+                <a:tint val="93000"/>
+                <a:satMod val="150000"/>
+                <a:shade val="98000"/>
+                <a:lumMod val="102000"/>
+              </a:schemeClr>
+            </a:gs>
+            <a:gs pos="50000">
+              <a:schemeClr val="phClr">
+                <a:tint val="98000"/>
+                <a:satMod val="130000"/>
+                <a:shade val="90000"/>
+                <a:lumMod val="103000"/>
+              </a:schemeClr>
+            </a:gs>
+            <a:gs pos="100000">
+              <a:schemeClr val="phClr">
+                <a:shade val="63000"/>
+                <a:satMod val="120000"/>
+              </a:schemeClr>
+            </a:gs>
+          </a:gsLst>
+          <a:lin ang="5400000" scaled="0"/>
+        </a:gradFill>
+      </a:bgFillStyleLst>
+    </a:fmtScheme>
+  </a:themeElements>
+  <a:objectDefaults/>
+  <a:extraClrSchemeLst/>
+  <a:extLst>
+    <a:ext uri="{05A4C25C-085E-4340-85A3-A5531E510DB2}">
+      <thm15:themeFamily xmlns:thm15="http://schemas.microsoft.com/office/thememl/2012/main" name="Office Theme" id="{62F939B6-93AF-4DB8-9C6B-D6C7DFDC589F}" vid="{4A3C46E8-61CC-4603-A589-7422A47A8E4A}"/>
+    </a:ext>
+  </a:extLst>
+</a:theme>
 </file>
</xml_diff>